<commit_message>
saving Figure 1 as .pdf
</commit_message>
<xml_diff>
--- a/manuscript/Figures_&_tables/Figure_1_design.pptx
+++ b/manuscript/Figures_&_tables/Figure_1_design.pptx
@@ -2,12 +2,12 @@
 <file path=ppt/presentation.xml><?xml version="1.0" encoding="utf-8"?>
 <p:presentation xmlns:a="http://schemas.openxmlformats.org/drawingml/2006/main" xmlns:r="http://schemas.openxmlformats.org/officeDocument/2006/relationships" xmlns:p="http://schemas.openxmlformats.org/presentationml/2006/main" saveSubsetFonts="1">
   <p:sldMasterIdLst>
-    <p:sldMasterId id="2147483696" r:id="rId1"/>
+    <p:sldMasterId id="2147483744" r:id="rId1"/>
   </p:sldMasterIdLst>
   <p:sldIdLst>
     <p:sldId id="256" r:id="rId2"/>
   </p:sldIdLst>
-  <p:sldSz cx="7199313" cy="7559675"/>
+  <p:sldSz cx="5364163" cy="7199313"/>
   <p:notesSz cx="6858000" cy="9144000"/>
   <p:defaultTextStyle>
     <a:defPPr>
@@ -141,15 +141,15 @@
         </p:nvSpPr>
         <p:spPr>
           <a:xfrm>
-            <a:off x="539949" y="1237197"/>
-            <a:ext cx="6119416" cy="2631887"/>
+            <a:off x="402312" y="1178222"/>
+            <a:ext cx="4559539" cy="2506427"/>
           </a:xfrm>
         </p:spPr>
         <p:txBody>
           <a:bodyPr anchor="b"/>
           <a:lstStyle>
             <a:lvl1pPr algn="ctr">
-              <a:defRPr sz="4724"/>
+              <a:defRPr sz="3520"/>
             </a:lvl1pPr>
           </a:lstStyle>
           <a:p>
@@ -173,8 +173,8 @@
         </p:nvSpPr>
         <p:spPr>
           <a:xfrm>
-            <a:off x="899914" y="3970580"/>
-            <a:ext cx="5399485" cy="1825171"/>
+            <a:off x="670521" y="3781306"/>
+            <a:ext cx="4023122" cy="1738167"/>
           </a:xfrm>
         </p:spPr>
         <p:txBody>
@@ -182,39 +182,39 @@
           <a:lstStyle>
             <a:lvl1pPr marL="0" indent="0" algn="ctr">
               <a:buNone/>
-              <a:defRPr sz="1890"/>
+              <a:defRPr sz="1408"/>
             </a:lvl1pPr>
-            <a:lvl2pPr marL="359954" indent="0" algn="ctr">
+            <a:lvl2pPr marL="268194" indent="0" algn="ctr">
               <a:buNone/>
-              <a:defRPr sz="1575"/>
+              <a:defRPr sz="1173"/>
             </a:lvl2pPr>
-            <a:lvl3pPr marL="719907" indent="0" algn="ctr">
+            <a:lvl3pPr marL="536387" indent="0" algn="ctr">
               <a:buNone/>
-              <a:defRPr sz="1417"/>
+              <a:defRPr sz="1056"/>
             </a:lvl3pPr>
-            <a:lvl4pPr marL="1079861" indent="0" algn="ctr">
+            <a:lvl4pPr marL="804581" indent="0" algn="ctr">
               <a:buNone/>
-              <a:defRPr sz="1260"/>
+              <a:defRPr sz="939"/>
             </a:lvl4pPr>
-            <a:lvl5pPr marL="1439814" indent="0" algn="ctr">
+            <a:lvl5pPr marL="1072774" indent="0" algn="ctr">
               <a:buNone/>
-              <a:defRPr sz="1260"/>
+              <a:defRPr sz="939"/>
             </a:lvl5pPr>
-            <a:lvl6pPr marL="1799768" indent="0" algn="ctr">
+            <a:lvl6pPr marL="1340968" indent="0" algn="ctr">
               <a:buNone/>
-              <a:defRPr sz="1260"/>
+              <a:defRPr sz="939"/>
             </a:lvl6pPr>
-            <a:lvl7pPr marL="2159721" indent="0" algn="ctr">
+            <a:lvl7pPr marL="1609161" indent="0" algn="ctr">
               <a:buNone/>
-              <a:defRPr sz="1260"/>
+              <a:defRPr sz="939"/>
             </a:lvl7pPr>
-            <a:lvl8pPr marL="2519675" indent="0" algn="ctr">
+            <a:lvl8pPr marL="1877355" indent="0" algn="ctr">
               <a:buNone/>
-              <a:defRPr sz="1260"/>
+              <a:defRPr sz="939"/>
             </a:lvl8pPr>
-            <a:lvl9pPr marL="2879628" indent="0" algn="ctr">
+            <a:lvl9pPr marL="2145548" indent="0" algn="ctr">
               <a:buNone/>
-              <a:defRPr sz="1260"/>
+              <a:defRPr sz="939"/>
             </a:lvl9pPr>
           </a:lstStyle>
           <a:p>
@@ -243,7 +243,7 @@
           <a:p>
             <a:fld id="{13930589-7EDD-4DA6-947C-2EEDC2092145}" type="datetimeFigureOut">
               <a:rPr lang="fr-FR" smtClean="0"/>
-              <a:t>08/03/2024</a:t>
+              <a:t>11/03/2024</a:t>
             </a:fld>
             <a:endParaRPr lang="fr-FR"/>
           </a:p>
@@ -294,7 +294,7 @@
     </p:spTree>
     <p:extLst>
       <p:ext uri="{BB962C8B-B14F-4D97-AF65-F5344CB8AC3E}">
-        <p14:creationId xmlns:p14="http://schemas.microsoft.com/office/powerpoint/2010/main" val="4152903424"/>
+        <p14:creationId xmlns:p14="http://schemas.microsoft.com/office/powerpoint/2010/main" val="3754121974"/>
       </p:ext>
     </p:extLst>
   </p:cSld>
@@ -413,7 +413,7 @@
           <a:p>
             <a:fld id="{13930589-7EDD-4DA6-947C-2EEDC2092145}" type="datetimeFigureOut">
               <a:rPr lang="fr-FR" smtClean="0"/>
-              <a:t>08/03/2024</a:t>
+              <a:t>11/03/2024</a:t>
             </a:fld>
             <a:endParaRPr lang="fr-FR"/>
           </a:p>
@@ -464,7 +464,7 @@
     </p:spTree>
     <p:extLst>
       <p:ext uri="{BB962C8B-B14F-4D97-AF65-F5344CB8AC3E}">
-        <p14:creationId xmlns:p14="http://schemas.microsoft.com/office/powerpoint/2010/main" val="341231648"/>
+        <p14:creationId xmlns:p14="http://schemas.microsoft.com/office/powerpoint/2010/main" val="1640570828"/>
       </p:ext>
     </p:extLst>
   </p:cSld>
@@ -503,8 +503,8 @@
         </p:nvSpPr>
         <p:spPr>
           <a:xfrm>
-            <a:off x="5152009" y="402483"/>
-            <a:ext cx="1552352" cy="6406475"/>
+            <a:off x="3838729" y="383297"/>
+            <a:ext cx="1156648" cy="6101085"/>
           </a:xfrm>
         </p:spPr>
         <p:txBody>
@@ -531,8 +531,8 @@
         </p:nvSpPr>
         <p:spPr>
           <a:xfrm>
-            <a:off x="494953" y="402483"/>
-            <a:ext cx="4567064" cy="6406475"/>
+            <a:off x="368786" y="383297"/>
+            <a:ext cx="3402891" cy="6101085"/>
           </a:xfrm>
         </p:spPr>
         <p:txBody>
@@ -593,7 +593,7 @@
           <a:p>
             <a:fld id="{13930589-7EDD-4DA6-947C-2EEDC2092145}" type="datetimeFigureOut">
               <a:rPr lang="fr-FR" smtClean="0"/>
-              <a:t>08/03/2024</a:t>
+              <a:t>11/03/2024</a:t>
             </a:fld>
             <a:endParaRPr lang="fr-FR"/>
           </a:p>
@@ -644,7 +644,7 @@
     </p:spTree>
     <p:extLst>
       <p:ext uri="{BB962C8B-B14F-4D97-AF65-F5344CB8AC3E}">
-        <p14:creationId xmlns:p14="http://schemas.microsoft.com/office/powerpoint/2010/main" val="912686094"/>
+        <p14:creationId xmlns:p14="http://schemas.microsoft.com/office/powerpoint/2010/main" val="280839010"/>
       </p:ext>
     </p:extLst>
   </p:cSld>
@@ -763,7 +763,7 @@
           <a:p>
             <a:fld id="{13930589-7EDD-4DA6-947C-2EEDC2092145}" type="datetimeFigureOut">
               <a:rPr lang="fr-FR" smtClean="0"/>
-              <a:t>08/03/2024</a:t>
+              <a:t>11/03/2024</a:t>
             </a:fld>
             <a:endParaRPr lang="fr-FR"/>
           </a:p>
@@ -814,7 +814,7 @@
     </p:spTree>
     <p:extLst>
       <p:ext uri="{BB962C8B-B14F-4D97-AF65-F5344CB8AC3E}">
-        <p14:creationId xmlns:p14="http://schemas.microsoft.com/office/powerpoint/2010/main" val="3862731448"/>
+        <p14:creationId xmlns:p14="http://schemas.microsoft.com/office/powerpoint/2010/main" val="2559339205"/>
       </p:ext>
     </p:extLst>
   </p:cSld>
@@ -853,15 +853,15 @@
         </p:nvSpPr>
         <p:spPr>
           <a:xfrm>
-            <a:off x="491204" y="1884671"/>
-            <a:ext cx="6209407" cy="3144614"/>
+            <a:off x="365992" y="1794831"/>
+            <a:ext cx="4626591" cy="2994714"/>
           </a:xfrm>
         </p:spPr>
         <p:txBody>
           <a:bodyPr anchor="b"/>
           <a:lstStyle>
             <a:lvl1pPr>
-              <a:defRPr sz="4724"/>
+              <a:defRPr sz="3520"/>
             </a:lvl1pPr>
           </a:lstStyle>
           <a:p>
@@ -885,8 +885,8 @@
         </p:nvSpPr>
         <p:spPr>
           <a:xfrm>
-            <a:off x="491204" y="5059035"/>
-            <a:ext cx="6209407" cy="1653678"/>
+            <a:off x="365992" y="4817876"/>
+            <a:ext cx="4626591" cy="1574849"/>
           </a:xfrm>
         </p:spPr>
         <p:txBody>
@@ -894,15 +894,15 @@
           <a:lstStyle>
             <a:lvl1pPr marL="0" indent="0">
               <a:buNone/>
-              <a:defRPr sz="1890">
+              <a:defRPr sz="1408">
                 <a:solidFill>
                   <a:schemeClr val="tx1"/>
                 </a:solidFill>
               </a:defRPr>
             </a:lvl1pPr>
-            <a:lvl2pPr marL="359954" indent="0">
+            <a:lvl2pPr marL="268194" indent="0">
               <a:buNone/>
-              <a:defRPr sz="1575">
+              <a:defRPr sz="1173">
                 <a:solidFill>
                   <a:schemeClr val="tx1">
                     <a:tint val="75000"/>
@@ -910,9 +910,9 @@
                 </a:solidFill>
               </a:defRPr>
             </a:lvl2pPr>
-            <a:lvl3pPr marL="719907" indent="0">
+            <a:lvl3pPr marL="536387" indent="0">
               <a:buNone/>
-              <a:defRPr sz="1417">
+              <a:defRPr sz="1056">
                 <a:solidFill>
                   <a:schemeClr val="tx1">
                     <a:tint val="75000"/>
@@ -920,9 +920,9 @@
                 </a:solidFill>
               </a:defRPr>
             </a:lvl3pPr>
-            <a:lvl4pPr marL="1079861" indent="0">
+            <a:lvl4pPr marL="804581" indent="0">
               <a:buNone/>
-              <a:defRPr sz="1260">
+              <a:defRPr sz="939">
                 <a:solidFill>
                   <a:schemeClr val="tx1">
                     <a:tint val="75000"/>
@@ -930,9 +930,9 @@
                 </a:solidFill>
               </a:defRPr>
             </a:lvl4pPr>
-            <a:lvl5pPr marL="1439814" indent="0">
+            <a:lvl5pPr marL="1072774" indent="0">
               <a:buNone/>
-              <a:defRPr sz="1260">
+              <a:defRPr sz="939">
                 <a:solidFill>
                   <a:schemeClr val="tx1">
                     <a:tint val="75000"/>
@@ -940,9 +940,9 @@
                 </a:solidFill>
               </a:defRPr>
             </a:lvl5pPr>
-            <a:lvl6pPr marL="1799768" indent="0">
+            <a:lvl6pPr marL="1340968" indent="0">
               <a:buNone/>
-              <a:defRPr sz="1260">
+              <a:defRPr sz="939">
                 <a:solidFill>
                   <a:schemeClr val="tx1">
                     <a:tint val="75000"/>
@@ -950,9 +950,9 @@
                 </a:solidFill>
               </a:defRPr>
             </a:lvl6pPr>
-            <a:lvl7pPr marL="2159721" indent="0">
+            <a:lvl7pPr marL="1609161" indent="0">
               <a:buNone/>
-              <a:defRPr sz="1260">
+              <a:defRPr sz="939">
                 <a:solidFill>
                   <a:schemeClr val="tx1">
                     <a:tint val="75000"/>
@@ -960,9 +960,9 @@
                 </a:solidFill>
               </a:defRPr>
             </a:lvl7pPr>
-            <a:lvl8pPr marL="2519675" indent="0">
+            <a:lvl8pPr marL="1877355" indent="0">
               <a:buNone/>
-              <a:defRPr sz="1260">
+              <a:defRPr sz="939">
                 <a:solidFill>
                   <a:schemeClr val="tx1">
                     <a:tint val="75000"/>
@@ -970,9 +970,9 @@
                 </a:solidFill>
               </a:defRPr>
             </a:lvl8pPr>
-            <a:lvl9pPr marL="2879628" indent="0">
+            <a:lvl9pPr marL="2145548" indent="0">
               <a:buNone/>
-              <a:defRPr sz="1260">
+              <a:defRPr sz="939">
                 <a:solidFill>
                   <a:schemeClr val="tx1">
                     <a:tint val="75000"/>
@@ -1007,7 +1007,7 @@
           <a:p>
             <a:fld id="{13930589-7EDD-4DA6-947C-2EEDC2092145}" type="datetimeFigureOut">
               <a:rPr lang="fr-FR" smtClean="0"/>
-              <a:t>08/03/2024</a:t>
+              <a:t>11/03/2024</a:t>
             </a:fld>
             <a:endParaRPr lang="fr-FR"/>
           </a:p>
@@ -1058,7 +1058,7 @@
     </p:spTree>
     <p:extLst>
       <p:ext uri="{BB962C8B-B14F-4D97-AF65-F5344CB8AC3E}">
-        <p14:creationId xmlns:p14="http://schemas.microsoft.com/office/powerpoint/2010/main" val="228555323"/>
+        <p14:creationId xmlns:p14="http://schemas.microsoft.com/office/powerpoint/2010/main" val="3526404544"/>
       </p:ext>
     </p:extLst>
   </p:cSld>
@@ -1120,8 +1120,8 @@
         </p:nvSpPr>
         <p:spPr>
           <a:xfrm>
-            <a:off x="494953" y="2012414"/>
-            <a:ext cx="3059708" cy="4796544"/>
+            <a:off x="368786" y="1916484"/>
+            <a:ext cx="2279769" cy="4567898"/>
           </a:xfrm>
         </p:spPr>
         <p:txBody>
@@ -1177,8 +1177,8 @@
         </p:nvSpPr>
         <p:spPr>
           <a:xfrm>
-            <a:off x="3644652" y="2012414"/>
-            <a:ext cx="3059708" cy="4796544"/>
+            <a:off x="2715608" y="1916484"/>
+            <a:ext cx="2279769" cy="4567898"/>
           </a:xfrm>
         </p:spPr>
         <p:txBody>
@@ -1239,7 +1239,7 @@
           <a:p>
             <a:fld id="{13930589-7EDD-4DA6-947C-2EEDC2092145}" type="datetimeFigureOut">
               <a:rPr lang="fr-FR" smtClean="0"/>
-              <a:t>08/03/2024</a:t>
+              <a:t>11/03/2024</a:t>
             </a:fld>
             <a:endParaRPr lang="fr-FR"/>
           </a:p>
@@ -1290,7 +1290,7 @@
     </p:spTree>
     <p:extLst>
       <p:ext uri="{BB962C8B-B14F-4D97-AF65-F5344CB8AC3E}">
-        <p14:creationId xmlns:p14="http://schemas.microsoft.com/office/powerpoint/2010/main" val="74280881"/>
+        <p14:creationId xmlns:p14="http://schemas.microsoft.com/office/powerpoint/2010/main" val="444064542"/>
       </p:ext>
     </p:extLst>
   </p:cSld>
@@ -1329,8 +1329,8 @@
         </p:nvSpPr>
         <p:spPr>
           <a:xfrm>
-            <a:off x="495891" y="402484"/>
-            <a:ext cx="6209407" cy="1461188"/>
+            <a:off x="369485" y="383299"/>
+            <a:ext cx="4626591" cy="1391534"/>
           </a:xfrm>
         </p:spPr>
         <p:txBody>
@@ -1357,8 +1357,8 @@
         </p:nvSpPr>
         <p:spPr>
           <a:xfrm>
-            <a:off x="495891" y="1853171"/>
-            <a:ext cx="3045646" cy="908210"/>
+            <a:off x="369485" y="1764832"/>
+            <a:ext cx="2269292" cy="864917"/>
           </a:xfrm>
         </p:spPr>
         <p:txBody>
@@ -1366,39 +1366,39 @@
           <a:lstStyle>
             <a:lvl1pPr marL="0" indent="0">
               <a:buNone/>
-              <a:defRPr sz="1890" b="1"/>
+              <a:defRPr sz="1408" b="1"/>
             </a:lvl1pPr>
-            <a:lvl2pPr marL="359954" indent="0">
+            <a:lvl2pPr marL="268194" indent="0">
               <a:buNone/>
-              <a:defRPr sz="1575" b="1"/>
+              <a:defRPr sz="1173" b="1"/>
             </a:lvl2pPr>
-            <a:lvl3pPr marL="719907" indent="0">
+            <a:lvl3pPr marL="536387" indent="0">
               <a:buNone/>
-              <a:defRPr sz="1417" b="1"/>
+              <a:defRPr sz="1056" b="1"/>
             </a:lvl3pPr>
-            <a:lvl4pPr marL="1079861" indent="0">
+            <a:lvl4pPr marL="804581" indent="0">
               <a:buNone/>
-              <a:defRPr sz="1260" b="1"/>
+              <a:defRPr sz="939" b="1"/>
             </a:lvl4pPr>
-            <a:lvl5pPr marL="1439814" indent="0">
+            <a:lvl5pPr marL="1072774" indent="0">
               <a:buNone/>
-              <a:defRPr sz="1260" b="1"/>
+              <a:defRPr sz="939" b="1"/>
             </a:lvl5pPr>
-            <a:lvl6pPr marL="1799768" indent="0">
+            <a:lvl6pPr marL="1340968" indent="0">
               <a:buNone/>
-              <a:defRPr sz="1260" b="1"/>
+              <a:defRPr sz="939" b="1"/>
             </a:lvl6pPr>
-            <a:lvl7pPr marL="2159721" indent="0">
+            <a:lvl7pPr marL="1609161" indent="0">
               <a:buNone/>
-              <a:defRPr sz="1260" b="1"/>
+              <a:defRPr sz="939" b="1"/>
             </a:lvl7pPr>
-            <a:lvl8pPr marL="2519675" indent="0">
+            <a:lvl8pPr marL="1877355" indent="0">
               <a:buNone/>
-              <a:defRPr sz="1260" b="1"/>
+              <a:defRPr sz="939" b="1"/>
             </a:lvl8pPr>
-            <a:lvl9pPr marL="2879628" indent="0">
+            <a:lvl9pPr marL="2145548" indent="0">
               <a:buNone/>
-              <a:defRPr sz="1260" b="1"/>
+              <a:defRPr sz="939" b="1"/>
             </a:lvl9pPr>
           </a:lstStyle>
           <a:p>
@@ -1422,8 +1422,8 @@
         </p:nvSpPr>
         <p:spPr>
           <a:xfrm>
-            <a:off x="495891" y="2761381"/>
-            <a:ext cx="3045646" cy="4061576"/>
+            <a:off x="369485" y="2629749"/>
+            <a:ext cx="2269292" cy="3867965"/>
           </a:xfrm>
         </p:spPr>
         <p:txBody>
@@ -1479,8 +1479,8 @@
         </p:nvSpPr>
         <p:spPr>
           <a:xfrm>
-            <a:off x="3644652" y="1853171"/>
-            <a:ext cx="3060646" cy="908210"/>
+            <a:off x="2715608" y="1764832"/>
+            <a:ext cx="2280468" cy="864917"/>
           </a:xfrm>
         </p:spPr>
         <p:txBody>
@@ -1488,39 +1488,39 @@
           <a:lstStyle>
             <a:lvl1pPr marL="0" indent="0">
               <a:buNone/>
-              <a:defRPr sz="1890" b="1"/>
+              <a:defRPr sz="1408" b="1"/>
             </a:lvl1pPr>
-            <a:lvl2pPr marL="359954" indent="0">
+            <a:lvl2pPr marL="268194" indent="0">
               <a:buNone/>
-              <a:defRPr sz="1575" b="1"/>
+              <a:defRPr sz="1173" b="1"/>
             </a:lvl2pPr>
-            <a:lvl3pPr marL="719907" indent="0">
+            <a:lvl3pPr marL="536387" indent="0">
               <a:buNone/>
-              <a:defRPr sz="1417" b="1"/>
+              <a:defRPr sz="1056" b="1"/>
             </a:lvl3pPr>
-            <a:lvl4pPr marL="1079861" indent="0">
+            <a:lvl4pPr marL="804581" indent="0">
               <a:buNone/>
-              <a:defRPr sz="1260" b="1"/>
+              <a:defRPr sz="939" b="1"/>
             </a:lvl4pPr>
-            <a:lvl5pPr marL="1439814" indent="0">
+            <a:lvl5pPr marL="1072774" indent="0">
               <a:buNone/>
-              <a:defRPr sz="1260" b="1"/>
+              <a:defRPr sz="939" b="1"/>
             </a:lvl5pPr>
-            <a:lvl6pPr marL="1799768" indent="0">
+            <a:lvl6pPr marL="1340968" indent="0">
               <a:buNone/>
-              <a:defRPr sz="1260" b="1"/>
+              <a:defRPr sz="939" b="1"/>
             </a:lvl6pPr>
-            <a:lvl7pPr marL="2159721" indent="0">
+            <a:lvl7pPr marL="1609161" indent="0">
               <a:buNone/>
-              <a:defRPr sz="1260" b="1"/>
+              <a:defRPr sz="939" b="1"/>
             </a:lvl7pPr>
-            <a:lvl8pPr marL="2519675" indent="0">
+            <a:lvl8pPr marL="1877355" indent="0">
               <a:buNone/>
-              <a:defRPr sz="1260" b="1"/>
+              <a:defRPr sz="939" b="1"/>
             </a:lvl8pPr>
-            <a:lvl9pPr marL="2879628" indent="0">
+            <a:lvl9pPr marL="2145548" indent="0">
               <a:buNone/>
-              <a:defRPr sz="1260" b="1"/>
+              <a:defRPr sz="939" b="1"/>
             </a:lvl9pPr>
           </a:lstStyle>
           <a:p>
@@ -1544,8 +1544,8 @@
         </p:nvSpPr>
         <p:spPr>
           <a:xfrm>
-            <a:off x="3644652" y="2761381"/>
-            <a:ext cx="3060646" cy="4061576"/>
+            <a:off x="2715608" y="2629749"/>
+            <a:ext cx="2280468" cy="3867965"/>
           </a:xfrm>
         </p:spPr>
         <p:txBody>
@@ -1606,7 +1606,7 @@
           <a:p>
             <a:fld id="{13930589-7EDD-4DA6-947C-2EEDC2092145}" type="datetimeFigureOut">
               <a:rPr lang="fr-FR" smtClean="0"/>
-              <a:t>08/03/2024</a:t>
+              <a:t>11/03/2024</a:t>
             </a:fld>
             <a:endParaRPr lang="fr-FR"/>
           </a:p>
@@ -1657,7 +1657,7 @@
     </p:spTree>
     <p:extLst>
       <p:ext uri="{BB962C8B-B14F-4D97-AF65-F5344CB8AC3E}">
-        <p14:creationId xmlns:p14="http://schemas.microsoft.com/office/powerpoint/2010/main" val="1266348090"/>
+        <p14:creationId xmlns:p14="http://schemas.microsoft.com/office/powerpoint/2010/main" val="2185942737"/>
       </p:ext>
     </p:extLst>
   </p:cSld>
@@ -1724,7 +1724,7 @@
           <a:p>
             <a:fld id="{13930589-7EDD-4DA6-947C-2EEDC2092145}" type="datetimeFigureOut">
               <a:rPr lang="fr-FR" smtClean="0"/>
-              <a:t>08/03/2024</a:t>
+              <a:t>11/03/2024</a:t>
             </a:fld>
             <a:endParaRPr lang="fr-FR"/>
           </a:p>
@@ -1775,7 +1775,7 @@
     </p:spTree>
     <p:extLst>
       <p:ext uri="{BB962C8B-B14F-4D97-AF65-F5344CB8AC3E}">
-        <p14:creationId xmlns:p14="http://schemas.microsoft.com/office/powerpoint/2010/main" val="778864251"/>
+        <p14:creationId xmlns:p14="http://schemas.microsoft.com/office/powerpoint/2010/main" val="2639461703"/>
       </p:ext>
     </p:extLst>
   </p:cSld>
@@ -1819,7 +1819,7 @@
           <a:p>
             <a:fld id="{13930589-7EDD-4DA6-947C-2EEDC2092145}" type="datetimeFigureOut">
               <a:rPr lang="fr-FR" smtClean="0"/>
-              <a:t>08/03/2024</a:t>
+              <a:t>11/03/2024</a:t>
             </a:fld>
             <a:endParaRPr lang="fr-FR"/>
           </a:p>
@@ -1870,7 +1870,7 @@
     </p:spTree>
     <p:extLst>
       <p:ext uri="{BB962C8B-B14F-4D97-AF65-F5344CB8AC3E}">
-        <p14:creationId xmlns:p14="http://schemas.microsoft.com/office/powerpoint/2010/main" val="3509909650"/>
+        <p14:creationId xmlns:p14="http://schemas.microsoft.com/office/powerpoint/2010/main" val="408045851"/>
       </p:ext>
     </p:extLst>
   </p:cSld>
@@ -1909,15 +1909,15 @@
         </p:nvSpPr>
         <p:spPr>
           <a:xfrm>
-            <a:off x="495890" y="503978"/>
-            <a:ext cx="2321966" cy="1763924"/>
+            <a:off x="369485" y="479954"/>
+            <a:ext cx="1730082" cy="1679840"/>
           </a:xfrm>
         </p:spPr>
         <p:txBody>
           <a:bodyPr anchor="b"/>
           <a:lstStyle>
             <a:lvl1pPr>
-              <a:defRPr sz="2519"/>
+              <a:defRPr sz="1877"/>
             </a:lvl1pPr>
           </a:lstStyle>
           <a:p>
@@ -1941,39 +1941,39 @@
         </p:nvSpPr>
         <p:spPr>
           <a:xfrm>
-            <a:off x="3060646" y="1088455"/>
-            <a:ext cx="3644652" cy="5372269"/>
+            <a:off x="2280468" y="1036570"/>
+            <a:ext cx="2715608" cy="5116178"/>
           </a:xfrm>
         </p:spPr>
         <p:txBody>
           <a:bodyPr/>
           <a:lstStyle>
             <a:lvl1pPr>
-              <a:defRPr sz="2519"/>
+              <a:defRPr sz="1877"/>
             </a:lvl1pPr>
             <a:lvl2pPr>
-              <a:defRPr sz="2204"/>
+              <a:defRPr sz="1642"/>
             </a:lvl2pPr>
             <a:lvl3pPr>
-              <a:defRPr sz="1890"/>
+              <a:defRPr sz="1408"/>
             </a:lvl3pPr>
             <a:lvl4pPr>
-              <a:defRPr sz="1575"/>
+              <a:defRPr sz="1173"/>
             </a:lvl4pPr>
             <a:lvl5pPr>
-              <a:defRPr sz="1575"/>
+              <a:defRPr sz="1173"/>
             </a:lvl5pPr>
             <a:lvl6pPr>
-              <a:defRPr sz="1575"/>
+              <a:defRPr sz="1173"/>
             </a:lvl6pPr>
             <a:lvl7pPr>
-              <a:defRPr sz="1575"/>
+              <a:defRPr sz="1173"/>
             </a:lvl7pPr>
             <a:lvl8pPr>
-              <a:defRPr sz="1575"/>
+              <a:defRPr sz="1173"/>
             </a:lvl8pPr>
             <a:lvl9pPr>
-              <a:defRPr sz="1575"/>
+              <a:defRPr sz="1173"/>
             </a:lvl9pPr>
           </a:lstStyle>
           <a:p>
@@ -2026,8 +2026,8 @@
         </p:nvSpPr>
         <p:spPr>
           <a:xfrm>
-            <a:off x="495890" y="2267902"/>
-            <a:ext cx="2321966" cy="4201570"/>
+            <a:off x="369485" y="2159794"/>
+            <a:ext cx="1730082" cy="4001285"/>
           </a:xfrm>
         </p:spPr>
         <p:txBody>
@@ -2035,39 +2035,39 @@
           <a:lstStyle>
             <a:lvl1pPr marL="0" indent="0">
               <a:buNone/>
-              <a:defRPr sz="1260"/>
+              <a:defRPr sz="939"/>
             </a:lvl1pPr>
-            <a:lvl2pPr marL="359954" indent="0">
+            <a:lvl2pPr marL="268194" indent="0">
               <a:buNone/>
-              <a:defRPr sz="1102"/>
+              <a:defRPr sz="821"/>
             </a:lvl2pPr>
-            <a:lvl3pPr marL="719907" indent="0">
+            <a:lvl3pPr marL="536387" indent="0">
               <a:buNone/>
-              <a:defRPr sz="945"/>
+              <a:defRPr sz="704"/>
             </a:lvl3pPr>
-            <a:lvl4pPr marL="1079861" indent="0">
+            <a:lvl4pPr marL="804581" indent="0">
               <a:buNone/>
-              <a:defRPr sz="787"/>
+              <a:defRPr sz="587"/>
             </a:lvl4pPr>
-            <a:lvl5pPr marL="1439814" indent="0">
+            <a:lvl5pPr marL="1072774" indent="0">
               <a:buNone/>
-              <a:defRPr sz="787"/>
+              <a:defRPr sz="587"/>
             </a:lvl5pPr>
-            <a:lvl6pPr marL="1799768" indent="0">
+            <a:lvl6pPr marL="1340968" indent="0">
               <a:buNone/>
-              <a:defRPr sz="787"/>
+              <a:defRPr sz="587"/>
             </a:lvl6pPr>
-            <a:lvl7pPr marL="2159721" indent="0">
+            <a:lvl7pPr marL="1609161" indent="0">
               <a:buNone/>
-              <a:defRPr sz="787"/>
+              <a:defRPr sz="587"/>
             </a:lvl7pPr>
-            <a:lvl8pPr marL="2519675" indent="0">
+            <a:lvl8pPr marL="1877355" indent="0">
               <a:buNone/>
-              <a:defRPr sz="787"/>
+              <a:defRPr sz="587"/>
             </a:lvl8pPr>
-            <a:lvl9pPr marL="2879628" indent="0">
+            <a:lvl9pPr marL="2145548" indent="0">
               <a:buNone/>
-              <a:defRPr sz="787"/>
+              <a:defRPr sz="587"/>
             </a:lvl9pPr>
           </a:lstStyle>
           <a:p>
@@ -2096,7 +2096,7 @@
           <a:p>
             <a:fld id="{13930589-7EDD-4DA6-947C-2EEDC2092145}" type="datetimeFigureOut">
               <a:rPr lang="fr-FR" smtClean="0"/>
-              <a:t>08/03/2024</a:t>
+              <a:t>11/03/2024</a:t>
             </a:fld>
             <a:endParaRPr lang="fr-FR"/>
           </a:p>
@@ -2147,7 +2147,7 @@
     </p:spTree>
     <p:extLst>
       <p:ext uri="{BB962C8B-B14F-4D97-AF65-F5344CB8AC3E}">
-        <p14:creationId xmlns:p14="http://schemas.microsoft.com/office/powerpoint/2010/main" val="2302251373"/>
+        <p14:creationId xmlns:p14="http://schemas.microsoft.com/office/powerpoint/2010/main" val="3539996828"/>
       </p:ext>
     </p:extLst>
   </p:cSld>
@@ -2186,15 +2186,15 @@
         </p:nvSpPr>
         <p:spPr>
           <a:xfrm>
-            <a:off x="495890" y="503978"/>
-            <a:ext cx="2321966" cy="1763924"/>
+            <a:off x="369485" y="479954"/>
+            <a:ext cx="1730082" cy="1679840"/>
           </a:xfrm>
         </p:spPr>
         <p:txBody>
           <a:bodyPr anchor="b"/>
           <a:lstStyle>
             <a:lvl1pPr>
-              <a:defRPr sz="2519"/>
+              <a:defRPr sz="1877"/>
             </a:lvl1pPr>
           </a:lstStyle>
           <a:p>
@@ -2218,8 +2218,8 @@
         </p:nvSpPr>
         <p:spPr>
           <a:xfrm>
-            <a:off x="3060646" y="1088455"/>
-            <a:ext cx="3644652" cy="5372269"/>
+            <a:off x="2280468" y="1036570"/>
+            <a:ext cx="2715608" cy="5116178"/>
           </a:xfrm>
         </p:spPr>
         <p:txBody>
@@ -2227,39 +2227,39 @@
           <a:lstStyle>
             <a:lvl1pPr marL="0" indent="0">
               <a:buNone/>
-              <a:defRPr sz="2519"/>
+              <a:defRPr sz="1877"/>
             </a:lvl1pPr>
-            <a:lvl2pPr marL="359954" indent="0">
+            <a:lvl2pPr marL="268194" indent="0">
               <a:buNone/>
-              <a:defRPr sz="2204"/>
+              <a:defRPr sz="1642"/>
             </a:lvl2pPr>
-            <a:lvl3pPr marL="719907" indent="0">
+            <a:lvl3pPr marL="536387" indent="0">
               <a:buNone/>
-              <a:defRPr sz="1890"/>
+              <a:defRPr sz="1408"/>
             </a:lvl3pPr>
-            <a:lvl4pPr marL="1079861" indent="0">
+            <a:lvl4pPr marL="804581" indent="0">
               <a:buNone/>
-              <a:defRPr sz="1575"/>
+              <a:defRPr sz="1173"/>
             </a:lvl4pPr>
-            <a:lvl5pPr marL="1439814" indent="0">
+            <a:lvl5pPr marL="1072774" indent="0">
               <a:buNone/>
-              <a:defRPr sz="1575"/>
+              <a:defRPr sz="1173"/>
             </a:lvl5pPr>
-            <a:lvl6pPr marL="1799768" indent="0">
+            <a:lvl6pPr marL="1340968" indent="0">
               <a:buNone/>
-              <a:defRPr sz="1575"/>
+              <a:defRPr sz="1173"/>
             </a:lvl6pPr>
-            <a:lvl7pPr marL="2159721" indent="0">
+            <a:lvl7pPr marL="1609161" indent="0">
               <a:buNone/>
-              <a:defRPr sz="1575"/>
+              <a:defRPr sz="1173"/>
             </a:lvl7pPr>
-            <a:lvl8pPr marL="2519675" indent="0">
+            <a:lvl8pPr marL="1877355" indent="0">
               <a:buNone/>
-              <a:defRPr sz="1575"/>
+              <a:defRPr sz="1173"/>
             </a:lvl8pPr>
-            <a:lvl9pPr marL="2879628" indent="0">
+            <a:lvl9pPr marL="2145548" indent="0">
               <a:buNone/>
-              <a:defRPr sz="1575"/>
+              <a:defRPr sz="1173"/>
             </a:lvl9pPr>
           </a:lstStyle>
           <a:p>
@@ -2283,8 +2283,8 @@
         </p:nvSpPr>
         <p:spPr>
           <a:xfrm>
-            <a:off x="495890" y="2267902"/>
-            <a:ext cx="2321966" cy="4201570"/>
+            <a:off x="369485" y="2159794"/>
+            <a:ext cx="1730082" cy="4001285"/>
           </a:xfrm>
         </p:spPr>
         <p:txBody>
@@ -2292,39 +2292,39 @@
           <a:lstStyle>
             <a:lvl1pPr marL="0" indent="0">
               <a:buNone/>
-              <a:defRPr sz="1260"/>
+              <a:defRPr sz="939"/>
             </a:lvl1pPr>
-            <a:lvl2pPr marL="359954" indent="0">
+            <a:lvl2pPr marL="268194" indent="0">
               <a:buNone/>
-              <a:defRPr sz="1102"/>
+              <a:defRPr sz="821"/>
             </a:lvl2pPr>
-            <a:lvl3pPr marL="719907" indent="0">
+            <a:lvl3pPr marL="536387" indent="0">
               <a:buNone/>
-              <a:defRPr sz="945"/>
+              <a:defRPr sz="704"/>
             </a:lvl3pPr>
-            <a:lvl4pPr marL="1079861" indent="0">
+            <a:lvl4pPr marL="804581" indent="0">
               <a:buNone/>
-              <a:defRPr sz="787"/>
+              <a:defRPr sz="587"/>
             </a:lvl4pPr>
-            <a:lvl5pPr marL="1439814" indent="0">
+            <a:lvl5pPr marL="1072774" indent="0">
               <a:buNone/>
-              <a:defRPr sz="787"/>
+              <a:defRPr sz="587"/>
             </a:lvl5pPr>
-            <a:lvl6pPr marL="1799768" indent="0">
+            <a:lvl6pPr marL="1340968" indent="0">
               <a:buNone/>
-              <a:defRPr sz="787"/>
+              <a:defRPr sz="587"/>
             </a:lvl6pPr>
-            <a:lvl7pPr marL="2159721" indent="0">
+            <a:lvl7pPr marL="1609161" indent="0">
               <a:buNone/>
-              <a:defRPr sz="787"/>
+              <a:defRPr sz="587"/>
             </a:lvl7pPr>
-            <a:lvl8pPr marL="2519675" indent="0">
+            <a:lvl8pPr marL="1877355" indent="0">
               <a:buNone/>
-              <a:defRPr sz="787"/>
+              <a:defRPr sz="587"/>
             </a:lvl8pPr>
-            <a:lvl9pPr marL="2879628" indent="0">
+            <a:lvl9pPr marL="2145548" indent="0">
               <a:buNone/>
-              <a:defRPr sz="787"/>
+              <a:defRPr sz="587"/>
             </a:lvl9pPr>
           </a:lstStyle>
           <a:p>
@@ -2353,7 +2353,7 @@
           <a:p>
             <a:fld id="{13930589-7EDD-4DA6-947C-2EEDC2092145}" type="datetimeFigureOut">
               <a:rPr lang="fr-FR" smtClean="0"/>
-              <a:t>08/03/2024</a:t>
+              <a:t>11/03/2024</a:t>
             </a:fld>
             <a:endParaRPr lang="fr-FR"/>
           </a:p>
@@ -2404,7 +2404,7 @@
     </p:spTree>
     <p:extLst>
       <p:ext uri="{BB962C8B-B14F-4D97-AF65-F5344CB8AC3E}">
-        <p14:creationId xmlns:p14="http://schemas.microsoft.com/office/powerpoint/2010/main" val="3505210936"/>
+        <p14:creationId xmlns:p14="http://schemas.microsoft.com/office/powerpoint/2010/main" val="179764029"/>
       </p:ext>
     </p:extLst>
   </p:cSld>
@@ -2448,8 +2448,8 @@
         </p:nvSpPr>
         <p:spPr>
           <a:xfrm>
-            <a:off x="494953" y="402484"/>
-            <a:ext cx="6209407" cy="1461188"/>
+            <a:off x="368786" y="383299"/>
+            <a:ext cx="4626591" cy="1391534"/>
           </a:xfrm>
           <a:prstGeom prst="rect">
             <a:avLst/>
@@ -2481,8 +2481,8 @@
         </p:nvSpPr>
         <p:spPr>
           <a:xfrm>
-            <a:off x="494953" y="2012414"/>
-            <a:ext cx="6209407" cy="4796544"/>
+            <a:off x="368786" y="1916484"/>
+            <a:ext cx="4626591" cy="4567898"/>
           </a:xfrm>
           <a:prstGeom prst="rect">
             <a:avLst/>
@@ -2543,8 +2543,8 @@
         </p:nvSpPr>
         <p:spPr>
           <a:xfrm>
-            <a:off x="494953" y="7006700"/>
-            <a:ext cx="1619845" cy="402483"/>
+            <a:off x="368786" y="6672698"/>
+            <a:ext cx="1206937" cy="383297"/>
           </a:xfrm>
           <a:prstGeom prst="rect">
             <a:avLst/>
@@ -2554,7 +2554,7 @@
           <a:bodyPr vert="horz" lIns="91440" tIns="45720" rIns="91440" bIns="45720" rtlCol="0" anchor="ctr"/>
           <a:lstStyle>
             <a:lvl1pPr algn="l">
-              <a:defRPr sz="945">
+              <a:defRPr sz="704">
                 <a:solidFill>
                   <a:schemeClr val="tx1">
                     <a:tint val="75000"/>
@@ -2566,7 +2566,7 @@
           <a:p>
             <a:fld id="{13930589-7EDD-4DA6-947C-2EEDC2092145}" type="datetimeFigureOut">
               <a:rPr lang="fr-FR" smtClean="0"/>
-              <a:t>08/03/2024</a:t>
+              <a:t>11/03/2024</a:t>
             </a:fld>
             <a:endParaRPr lang="fr-FR"/>
           </a:p>
@@ -2584,8 +2584,8 @@
         </p:nvSpPr>
         <p:spPr>
           <a:xfrm>
-            <a:off x="2384773" y="7006700"/>
-            <a:ext cx="2429768" cy="402483"/>
+            <a:off x="1776879" y="6672698"/>
+            <a:ext cx="1810405" cy="383297"/>
           </a:xfrm>
           <a:prstGeom prst="rect">
             <a:avLst/>
@@ -2595,7 +2595,7 @@
           <a:bodyPr vert="horz" lIns="91440" tIns="45720" rIns="91440" bIns="45720" rtlCol="0" anchor="ctr"/>
           <a:lstStyle>
             <a:lvl1pPr algn="ctr">
-              <a:defRPr sz="945">
+              <a:defRPr sz="704">
                 <a:solidFill>
                   <a:schemeClr val="tx1">
                     <a:tint val="75000"/>
@@ -2621,8 +2621,8 @@
         </p:nvSpPr>
         <p:spPr>
           <a:xfrm>
-            <a:off x="5084515" y="7006700"/>
-            <a:ext cx="1619845" cy="402483"/>
+            <a:off x="3788440" y="6672698"/>
+            <a:ext cx="1206937" cy="383297"/>
           </a:xfrm>
           <a:prstGeom prst="rect">
             <a:avLst/>
@@ -2632,7 +2632,7 @@
           <a:bodyPr vert="horz" lIns="91440" tIns="45720" rIns="91440" bIns="45720" rtlCol="0" anchor="ctr"/>
           <a:lstStyle>
             <a:lvl1pPr algn="r">
-              <a:defRPr sz="945">
+              <a:defRPr sz="704">
                 <a:solidFill>
                   <a:schemeClr val="tx1">
                     <a:tint val="75000"/>
@@ -2653,27 +2653,27 @@
     </p:spTree>
     <p:extLst>
       <p:ext uri="{BB962C8B-B14F-4D97-AF65-F5344CB8AC3E}">
-        <p14:creationId xmlns:p14="http://schemas.microsoft.com/office/powerpoint/2010/main" val="2118870101"/>
+        <p14:creationId xmlns:p14="http://schemas.microsoft.com/office/powerpoint/2010/main" val="3270456401"/>
       </p:ext>
     </p:extLst>
   </p:cSld>
   <p:clrMap bg1="lt1" tx1="dk1" bg2="lt2" tx2="dk2" accent1="accent1" accent2="accent2" accent3="accent3" accent4="accent4" accent5="accent5" accent6="accent6" hlink="hlink" folHlink="folHlink"/>
   <p:sldLayoutIdLst>
-    <p:sldLayoutId id="2147483697" r:id="rId1"/>
-    <p:sldLayoutId id="2147483698" r:id="rId2"/>
-    <p:sldLayoutId id="2147483699" r:id="rId3"/>
-    <p:sldLayoutId id="2147483700" r:id="rId4"/>
-    <p:sldLayoutId id="2147483701" r:id="rId5"/>
-    <p:sldLayoutId id="2147483702" r:id="rId6"/>
-    <p:sldLayoutId id="2147483703" r:id="rId7"/>
-    <p:sldLayoutId id="2147483704" r:id="rId8"/>
-    <p:sldLayoutId id="2147483705" r:id="rId9"/>
-    <p:sldLayoutId id="2147483706" r:id="rId10"/>
-    <p:sldLayoutId id="2147483707" r:id="rId11"/>
+    <p:sldLayoutId id="2147483745" r:id="rId1"/>
+    <p:sldLayoutId id="2147483746" r:id="rId2"/>
+    <p:sldLayoutId id="2147483747" r:id="rId3"/>
+    <p:sldLayoutId id="2147483748" r:id="rId4"/>
+    <p:sldLayoutId id="2147483749" r:id="rId5"/>
+    <p:sldLayoutId id="2147483750" r:id="rId6"/>
+    <p:sldLayoutId id="2147483751" r:id="rId7"/>
+    <p:sldLayoutId id="2147483752" r:id="rId8"/>
+    <p:sldLayoutId id="2147483753" r:id="rId9"/>
+    <p:sldLayoutId id="2147483754" r:id="rId10"/>
+    <p:sldLayoutId id="2147483755" r:id="rId11"/>
   </p:sldLayoutIdLst>
   <p:txStyles>
     <p:titleStyle>
-      <a:lvl1pPr algn="l" defTabSz="719907" rtl="0" eaLnBrk="1" latinLnBrk="0" hangingPunct="1">
+      <a:lvl1pPr algn="l" defTabSz="536387" rtl="0" eaLnBrk="1" latinLnBrk="0" hangingPunct="1">
         <a:lnSpc>
           <a:spcPct val="90000"/>
         </a:lnSpc>
@@ -2681,7 +2681,7 @@
           <a:spcPct val="0"/>
         </a:spcBef>
         <a:buNone/>
-        <a:defRPr sz="3464" kern="1200">
+        <a:defRPr sz="2581" kern="1200">
           <a:solidFill>
             <a:schemeClr val="tx1"/>
           </a:solidFill>
@@ -2692,16 +2692,16 @@
       </a:lvl1pPr>
     </p:titleStyle>
     <p:bodyStyle>
-      <a:lvl1pPr marL="179977" indent="-179977" algn="l" defTabSz="719907" rtl="0" eaLnBrk="1" latinLnBrk="0" hangingPunct="1">
+      <a:lvl1pPr marL="134097" indent="-134097" algn="l" defTabSz="536387" rtl="0" eaLnBrk="1" latinLnBrk="0" hangingPunct="1">
         <a:lnSpc>
           <a:spcPct val="90000"/>
         </a:lnSpc>
         <a:spcBef>
-          <a:spcPts val="787"/>
+          <a:spcPts val="587"/>
         </a:spcBef>
         <a:buFont typeface="Arial" panose="020B0604020202020204" pitchFamily="34" charset="0"/>
         <a:buChar char="•"/>
-        <a:defRPr sz="2204" kern="1200">
+        <a:defRPr sz="1642" kern="1200">
           <a:solidFill>
             <a:schemeClr val="tx1"/>
           </a:solidFill>
@@ -2710,16 +2710,16 @@
           <a:cs typeface="+mn-cs"/>
         </a:defRPr>
       </a:lvl1pPr>
-      <a:lvl2pPr marL="539930" indent="-179977" algn="l" defTabSz="719907" rtl="0" eaLnBrk="1" latinLnBrk="0" hangingPunct="1">
+      <a:lvl2pPr marL="402290" indent="-134097" algn="l" defTabSz="536387" rtl="0" eaLnBrk="1" latinLnBrk="0" hangingPunct="1">
         <a:lnSpc>
           <a:spcPct val="90000"/>
         </a:lnSpc>
         <a:spcBef>
-          <a:spcPts val="394"/>
+          <a:spcPts val="293"/>
         </a:spcBef>
         <a:buFont typeface="Arial" panose="020B0604020202020204" pitchFamily="34" charset="0"/>
         <a:buChar char="•"/>
-        <a:defRPr sz="1890" kern="1200">
+        <a:defRPr sz="1408" kern="1200">
           <a:solidFill>
             <a:schemeClr val="tx1"/>
           </a:solidFill>
@@ -2728,16 +2728,16 @@
           <a:cs typeface="+mn-cs"/>
         </a:defRPr>
       </a:lvl2pPr>
-      <a:lvl3pPr marL="899884" indent="-179977" algn="l" defTabSz="719907" rtl="0" eaLnBrk="1" latinLnBrk="0" hangingPunct="1">
+      <a:lvl3pPr marL="670484" indent="-134097" algn="l" defTabSz="536387" rtl="0" eaLnBrk="1" latinLnBrk="0" hangingPunct="1">
         <a:lnSpc>
           <a:spcPct val="90000"/>
         </a:lnSpc>
         <a:spcBef>
-          <a:spcPts val="394"/>
+          <a:spcPts val="293"/>
         </a:spcBef>
         <a:buFont typeface="Arial" panose="020B0604020202020204" pitchFamily="34" charset="0"/>
         <a:buChar char="•"/>
-        <a:defRPr sz="1575" kern="1200">
+        <a:defRPr sz="1173" kern="1200">
           <a:solidFill>
             <a:schemeClr val="tx1"/>
           </a:solidFill>
@@ -2746,16 +2746,16 @@
           <a:cs typeface="+mn-cs"/>
         </a:defRPr>
       </a:lvl3pPr>
-      <a:lvl4pPr marL="1259837" indent="-179977" algn="l" defTabSz="719907" rtl="0" eaLnBrk="1" latinLnBrk="0" hangingPunct="1">
+      <a:lvl4pPr marL="938677" indent="-134097" algn="l" defTabSz="536387" rtl="0" eaLnBrk="1" latinLnBrk="0" hangingPunct="1">
         <a:lnSpc>
           <a:spcPct val="90000"/>
         </a:lnSpc>
         <a:spcBef>
-          <a:spcPts val="394"/>
+          <a:spcPts val="293"/>
         </a:spcBef>
         <a:buFont typeface="Arial" panose="020B0604020202020204" pitchFamily="34" charset="0"/>
         <a:buChar char="•"/>
-        <a:defRPr sz="1417" kern="1200">
+        <a:defRPr sz="1056" kern="1200">
           <a:solidFill>
             <a:schemeClr val="tx1"/>
           </a:solidFill>
@@ -2764,16 +2764,16 @@
           <a:cs typeface="+mn-cs"/>
         </a:defRPr>
       </a:lvl4pPr>
-      <a:lvl5pPr marL="1619791" indent="-179977" algn="l" defTabSz="719907" rtl="0" eaLnBrk="1" latinLnBrk="0" hangingPunct="1">
+      <a:lvl5pPr marL="1206871" indent="-134097" algn="l" defTabSz="536387" rtl="0" eaLnBrk="1" latinLnBrk="0" hangingPunct="1">
         <a:lnSpc>
           <a:spcPct val="90000"/>
         </a:lnSpc>
         <a:spcBef>
-          <a:spcPts val="394"/>
+          <a:spcPts val="293"/>
         </a:spcBef>
         <a:buFont typeface="Arial" panose="020B0604020202020204" pitchFamily="34" charset="0"/>
         <a:buChar char="•"/>
-        <a:defRPr sz="1417" kern="1200">
+        <a:defRPr sz="1056" kern="1200">
           <a:solidFill>
             <a:schemeClr val="tx1"/>
           </a:solidFill>
@@ -2782,16 +2782,16 @@
           <a:cs typeface="+mn-cs"/>
         </a:defRPr>
       </a:lvl5pPr>
-      <a:lvl6pPr marL="1979745" indent="-179977" algn="l" defTabSz="719907" rtl="0" eaLnBrk="1" latinLnBrk="0" hangingPunct="1">
+      <a:lvl6pPr marL="1475064" indent="-134097" algn="l" defTabSz="536387" rtl="0" eaLnBrk="1" latinLnBrk="0" hangingPunct="1">
         <a:lnSpc>
           <a:spcPct val="90000"/>
         </a:lnSpc>
         <a:spcBef>
-          <a:spcPts val="394"/>
+          <a:spcPts val="293"/>
         </a:spcBef>
         <a:buFont typeface="Arial" panose="020B0604020202020204" pitchFamily="34" charset="0"/>
         <a:buChar char="•"/>
-        <a:defRPr sz="1417" kern="1200">
+        <a:defRPr sz="1056" kern="1200">
           <a:solidFill>
             <a:schemeClr val="tx1"/>
           </a:solidFill>
@@ -2800,16 +2800,16 @@
           <a:cs typeface="+mn-cs"/>
         </a:defRPr>
       </a:lvl6pPr>
-      <a:lvl7pPr marL="2339698" indent="-179977" algn="l" defTabSz="719907" rtl="0" eaLnBrk="1" latinLnBrk="0" hangingPunct="1">
+      <a:lvl7pPr marL="1743258" indent="-134097" algn="l" defTabSz="536387" rtl="0" eaLnBrk="1" latinLnBrk="0" hangingPunct="1">
         <a:lnSpc>
           <a:spcPct val="90000"/>
         </a:lnSpc>
         <a:spcBef>
-          <a:spcPts val="394"/>
+          <a:spcPts val="293"/>
         </a:spcBef>
         <a:buFont typeface="Arial" panose="020B0604020202020204" pitchFamily="34" charset="0"/>
         <a:buChar char="•"/>
-        <a:defRPr sz="1417" kern="1200">
+        <a:defRPr sz="1056" kern="1200">
           <a:solidFill>
             <a:schemeClr val="tx1"/>
           </a:solidFill>
@@ -2818,16 +2818,16 @@
           <a:cs typeface="+mn-cs"/>
         </a:defRPr>
       </a:lvl7pPr>
-      <a:lvl8pPr marL="2699652" indent="-179977" algn="l" defTabSz="719907" rtl="0" eaLnBrk="1" latinLnBrk="0" hangingPunct="1">
+      <a:lvl8pPr marL="2011451" indent="-134097" algn="l" defTabSz="536387" rtl="0" eaLnBrk="1" latinLnBrk="0" hangingPunct="1">
         <a:lnSpc>
           <a:spcPct val="90000"/>
         </a:lnSpc>
         <a:spcBef>
-          <a:spcPts val="394"/>
+          <a:spcPts val="293"/>
         </a:spcBef>
         <a:buFont typeface="Arial" panose="020B0604020202020204" pitchFamily="34" charset="0"/>
         <a:buChar char="•"/>
-        <a:defRPr sz="1417" kern="1200">
+        <a:defRPr sz="1056" kern="1200">
           <a:solidFill>
             <a:schemeClr val="tx1"/>
           </a:solidFill>
@@ -2836,16 +2836,16 @@
           <a:cs typeface="+mn-cs"/>
         </a:defRPr>
       </a:lvl8pPr>
-      <a:lvl9pPr marL="3059605" indent="-179977" algn="l" defTabSz="719907" rtl="0" eaLnBrk="1" latinLnBrk="0" hangingPunct="1">
+      <a:lvl9pPr marL="2279645" indent="-134097" algn="l" defTabSz="536387" rtl="0" eaLnBrk="1" latinLnBrk="0" hangingPunct="1">
         <a:lnSpc>
           <a:spcPct val="90000"/>
         </a:lnSpc>
         <a:spcBef>
-          <a:spcPts val="394"/>
+          <a:spcPts val="293"/>
         </a:spcBef>
         <a:buFont typeface="Arial" panose="020B0604020202020204" pitchFamily="34" charset="0"/>
         <a:buChar char="•"/>
-        <a:defRPr sz="1417" kern="1200">
+        <a:defRPr sz="1056" kern="1200">
           <a:solidFill>
             <a:schemeClr val="tx1"/>
           </a:solidFill>
@@ -2859,8 +2859,8 @@
       <a:defPPr>
         <a:defRPr lang="en-US"/>
       </a:defPPr>
-      <a:lvl1pPr marL="0" algn="l" defTabSz="719907" rtl="0" eaLnBrk="1" latinLnBrk="0" hangingPunct="1">
-        <a:defRPr sz="1417" kern="1200">
+      <a:lvl1pPr marL="0" algn="l" defTabSz="536387" rtl="0" eaLnBrk="1" latinLnBrk="0" hangingPunct="1">
+        <a:defRPr sz="1056" kern="1200">
           <a:solidFill>
             <a:schemeClr val="tx1"/>
           </a:solidFill>
@@ -2869,8 +2869,8 @@
           <a:cs typeface="+mn-cs"/>
         </a:defRPr>
       </a:lvl1pPr>
-      <a:lvl2pPr marL="359954" algn="l" defTabSz="719907" rtl="0" eaLnBrk="1" latinLnBrk="0" hangingPunct="1">
-        <a:defRPr sz="1417" kern="1200">
+      <a:lvl2pPr marL="268194" algn="l" defTabSz="536387" rtl="0" eaLnBrk="1" latinLnBrk="0" hangingPunct="1">
+        <a:defRPr sz="1056" kern="1200">
           <a:solidFill>
             <a:schemeClr val="tx1"/>
           </a:solidFill>
@@ -2879,8 +2879,8 @@
           <a:cs typeface="+mn-cs"/>
         </a:defRPr>
       </a:lvl2pPr>
-      <a:lvl3pPr marL="719907" algn="l" defTabSz="719907" rtl="0" eaLnBrk="1" latinLnBrk="0" hangingPunct="1">
-        <a:defRPr sz="1417" kern="1200">
+      <a:lvl3pPr marL="536387" algn="l" defTabSz="536387" rtl="0" eaLnBrk="1" latinLnBrk="0" hangingPunct="1">
+        <a:defRPr sz="1056" kern="1200">
           <a:solidFill>
             <a:schemeClr val="tx1"/>
           </a:solidFill>
@@ -2889,8 +2889,8 @@
           <a:cs typeface="+mn-cs"/>
         </a:defRPr>
       </a:lvl3pPr>
-      <a:lvl4pPr marL="1079861" algn="l" defTabSz="719907" rtl="0" eaLnBrk="1" latinLnBrk="0" hangingPunct="1">
-        <a:defRPr sz="1417" kern="1200">
+      <a:lvl4pPr marL="804581" algn="l" defTabSz="536387" rtl="0" eaLnBrk="1" latinLnBrk="0" hangingPunct="1">
+        <a:defRPr sz="1056" kern="1200">
           <a:solidFill>
             <a:schemeClr val="tx1"/>
           </a:solidFill>
@@ -2899,8 +2899,8 @@
           <a:cs typeface="+mn-cs"/>
         </a:defRPr>
       </a:lvl4pPr>
-      <a:lvl5pPr marL="1439814" algn="l" defTabSz="719907" rtl="0" eaLnBrk="1" latinLnBrk="0" hangingPunct="1">
-        <a:defRPr sz="1417" kern="1200">
+      <a:lvl5pPr marL="1072774" algn="l" defTabSz="536387" rtl="0" eaLnBrk="1" latinLnBrk="0" hangingPunct="1">
+        <a:defRPr sz="1056" kern="1200">
           <a:solidFill>
             <a:schemeClr val="tx1"/>
           </a:solidFill>
@@ -2909,8 +2909,8 @@
           <a:cs typeface="+mn-cs"/>
         </a:defRPr>
       </a:lvl5pPr>
-      <a:lvl6pPr marL="1799768" algn="l" defTabSz="719907" rtl="0" eaLnBrk="1" latinLnBrk="0" hangingPunct="1">
-        <a:defRPr sz="1417" kern="1200">
+      <a:lvl6pPr marL="1340968" algn="l" defTabSz="536387" rtl="0" eaLnBrk="1" latinLnBrk="0" hangingPunct="1">
+        <a:defRPr sz="1056" kern="1200">
           <a:solidFill>
             <a:schemeClr val="tx1"/>
           </a:solidFill>
@@ -2919,8 +2919,8 @@
           <a:cs typeface="+mn-cs"/>
         </a:defRPr>
       </a:lvl6pPr>
-      <a:lvl7pPr marL="2159721" algn="l" defTabSz="719907" rtl="0" eaLnBrk="1" latinLnBrk="0" hangingPunct="1">
-        <a:defRPr sz="1417" kern="1200">
+      <a:lvl7pPr marL="1609161" algn="l" defTabSz="536387" rtl="0" eaLnBrk="1" latinLnBrk="0" hangingPunct="1">
+        <a:defRPr sz="1056" kern="1200">
           <a:solidFill>
             <a:schemeClr val="tx1"/>
           </a:solidFill>
@@ -2929,8 +2929,8 @@
           <a:cs typeface="+mn-cs"/>
         </a:defRPr>
       </a:lvl7pPr>
-      <a:lvl8pPr marL="2519675" algn="l" defTabSz="719907" rtl="0" eaLnBrk="1" latinLnBrk="0" hangingPunct="1">
-        <a:defRPr sz="1417" kern="1200">
+      <a:lvl8pPr marL="1877355" algn="l" defTabSz="536387" rtl="0" eaLnBrk="1" latinLnBrk="0" hangingPunct="1">
+        <a:defRPr sz="1056" kern="1200">
           <a:solidFill>
             <a:schemeClr val="tx1"/>
           </a:solidFill>
@@ -2939,8 +2939,8 @@
           <a:cs typeface="+mn-cs"/>
         </a:defRPr>
       </a:lvl8pPr>
-      <a:lvl9pPr marL="2879628" algn="l" defTabSz="719907" rtl="0" eaLnBrk="1" latinLnBrk="0" hangingPunct="1">
-        <a:defRPr sz="1417" kern="1200">
+      <a:lvl9pPr marL="2145548" algn="l" defTabSz="536387" rtl="0" eaLnBrk="1" latinLnBrk="0" hangingPunct="1">
+        <a:defRPr sz="1056" kern="1200">
           <a:solidFill>
             <a:schemeClr val="tx1"/>
           </a:solidFill>
@@ -2983,7 +2983,7 @@
         </p:nvSpPr>
         <p:spPr>
           <a:xfrm>
-            <a:off x="2346538" y="200331"/>
+            <a:off x="1373547" y="20150"/>
             <a:ext cx="1088508" cy="390210"/>
           </a:xfrm>
         </p:spPr>
@@ -3003,13 +3003,6 @@
               </a:rPr>
               <a:t>Control</a:t>
             </a:r>
-            <a:endParaRPr lang="fr-FR" sz="1600" b="1" dirty="0">
-              <a:solidFill>
-                <a:schemeClr val="accent1"/>
-              </a:solidFill>
-              <a:latin typeface="Arial" panose="020B0604020202020204" pitchFamily="34" charset="0"/>
-              <a:cs typeface="Arial" panose="020B0604020202020204" pitchFamily="34" charset="0"/>
-            </a:endParaRPr>
           </a:p>
         </p:txBody>
       </p:sp>
@@ -3023,7 +3016,7 @@
         </p:nvSpPr>
         <p:spPr>
           <a:xfrm>
-            <a:off x="4644773" y="200331"/>
+            <a:off x="3671782" y="20150"/>
             <a:ext cx="1087200" cy="390210"/>
           </a:xfrm>
           <a:prstGeom prst="rect">
@@ -3165,7 +3158,7 @@
         </p:nvGrpSpPr>
         <p:grpSpPr>
           <a:xfrm>
-            <a:off x="1196410" y="2950825"/>
+            <a:off x="223419" y="2770648"/>
             <a:ext cx="4806492" cy="4378939"/>
             <a:chOff x="1118066" y="2950825"/>
             <a:chExt cx="4806492" cy="4378939"/>
@@ -3605,19 +3598,8 @@
                     <a:latin typeface="Arial" panose="020B0604020202020204" pitchFamily="34" charset="0"/>
                     <a:cs typeface="Arial" panose="020B0604020202020204" pitchFamily="34" charset="0"/>
                   </a:rPr>
-                  <a:t>: </a:t>
+                  <a:t>: Monoculture</a:t>
                 </a:r>
-                <a:r>
-                  <a:rPr lang="fr-FR" sz="1600" dirty="0">
-                    <a:latin typeface="Arial" panose="020B0604020202020204" pitchFamily="34" charset="0"/>
-                    <a:cs typeface="Arial" panose="020B0604020202020204" pitchFamily="34" charset="0"/>
-                  </a:rPr>
-                  <a:t>Monoculture</a:t>
-                </a:r>
-                <a:endParaRPr lang="fr-FR" sz="1600" dirty="0">
-                  <a:latin typeface="Arial" panose="020B0604020202020204" pitchFamily="34" charset="0"/>
-                  <a:cs typeface="Arial" panose="020B0604020202020204" pitchFamily="34" charset="0"/>
-                </a:endParaRPr>
               </a:p>
             </p:txBody>
           </p:sp>
@@ -4000,19 +3982,8 @@
                     <a:latin typeface="Arial" panose="020B0604020202020204" pitchFamily="34" charset="0"/>
                     <a:cs typeface="Arial" panose="020B0604020202020204" pitchFamily="34" charset="0"/>
                   </a:rPr>
-                  <a:t>: </a:t>
+                  <a:t>: Mixture</a:t>
                 </a:r>
-                <a:r>
-                  <a:rPr lang="fr-FR" sz="1600" dirty="0">
-                    <a:latin typeface="Arial" panose="020B0604020202020204" pitchFamily="34" charset="0"/>
-                    <a:cs typeface="Arial" panose="020B0604020202020204" pitchFamily="34" charset="0"/>
-                  </a:rPr>
-                  <a:t>Mixture</a:t>
-                </a:r>
-                <a:endParaRPr lang="fr-FR" sz="1600" dirty="0">
-                  <a:latin typeface="Arial" panose="020B0604020202020204" pitchFamily="34" charset="0"/>
-                  <a:cs typeface="Arial" panose="020B0604020202020204" pitchFamily="34" charset="0"/>
-                </a:endParaRPr>
               </a:p>
             </p:txBody>
           </p:sp>
@@ -4047,10 +4018,6 @@
                 </a:rPr>
                 <a:t>(b)</a:t>
               </a:r>
-              <a:endParaRPr lang="fr-FR" sz="1600" b="1" dirty="0">
-                <a:latin typeface="Arial" panose="020B0604020202020204" pitchFamily="34" charset="0"/>
-                <a:cs typeface="Arial" panose="020B0604020202020204" pitchFamily="34" charset="0"/>
-              </a:endParaRPr>
             </a:p>
           </p:txBody>
         </p:sp>
@@ -4084,10 +4051,6 @@
                 </a:rPr>
                 <a:t>(c)</a:t>
               </a:r>
-              <a:endParaRPr lang="fr-FR" sz="1600" b="1" dirty="0">
-                <a:latin typeface="Arial" panose="020B0604020202020204" pitchFamily="34" charset="0"/>
-                <a:cs typeface="Arial" panose="020B0604020202020204" pitchFamily="34" charset="0"/>
-              </a:endParaRPr>
             </a:p>
           </p:txBody>
         </p:sp>
@@ -4121,10 +4084,6 @@
                 </a:rPr>
                 <a:t>(d)</a:t>
               </a:r>
-              <a:endParaRPr lang="fr-FR" sz="1600" b="1" dirty="0">
-                <a:latin typeface="Arial" panose="020B0604020202020204" pitchFamily="34" charset="0"/>
-                <a:cs typeface="Arial" panose="020B0604020202020204" pitchFamily="34" charset="0"/>
-              </a:endParaRPr>
             </a:p>
           </p:txBody>
         </p:sp>
@@ -4137,10 +4096,10 @@
         </p:nvGrpSpPr>
         <p:grpSpPr>
           <a:xfrm>
-            <a:off x="934836" y="95556"/>
-            <a:ext cx="5329641" cy="2726654"/>
-            <a:chOff x="818835" y="95556"/>
-            <a:chExt cx="5329641" cy="2726654"/>
+            <a:off x="-38153" y="-58249"/>
+            <a:ext cx="5329641" cy="2700278"/>
+            <a:chOff x="818835" y="121932"/>
+            <a:chExt cx="5329641" cy="2700278"/>
           </a:xfrm>
         </p:grpSpPr>
         <p:sp>
@@ -4151,7 +4110,7 @@
           </p:nvSpPr>
           <p:spPr>
             <a:xfrm>
-              <a:off x="818835" y="95556"/>
+              <a:off x="818835" y="121932"/>
               <a:ext cx="523875" cy="338554"/>
             </a:xfrm>
             <a:prstGeom prst="rect">
@@ -4173,10 +4132,6 @@
                 </a:rPr>
                 <a:t>(a)</a:t>
               </a:r>
-              <a:endParaRPr lang="fr-FR" sz="1600" b="1" dirty="0">
-                <a:latin typeface="Arial" panose="020B0604020202020204" pitchFamily="34" charset="0"/>
-                <a:cs typeface="Arial" panose="020B0604020202020204" pitchFamily="34" charset="0"/>
-              </a:endParaRPr>
             </a:p>
           </p:txBody>
         </p:sp>

</xml_diff>

<commit_message>
update all figures from root surf to root area
</commit_message>
<xml_diff>
--- a/manuscript/Figures_&_tables/Figure_1_design.pptx
+++ b/manuscript/Figures_&_tables/Figure_1_design.pptx
@@ -154,7 +154,7 @@
           </a:lstStyle>
           <a:p>
             <a:r>
-              <a:rPr lang="fr-FR" smtClean="0"/>
+              <a:rPr lang="fr-FR"/>
               <a:t>Modifiez le style du titre</a:t>
             </a:r>
             <a:endParaRPr lang="en-US" dirty="0"/>
@@ -219,7 +219,7 @@
           </a:lstStyle>
           <a:p>
             <a:r>
-              <a:rPr lang="fr-FR" smtClean="0"/>
+              <a:rPr lang="fr-FR"/>
               <a:t>Modifier le style des sous-titres du masque</a:t>
             </a:r>
             <a:endParaRPr lang="en-US" dirty="0"/>
@@ -243,7 +243,7 @@
           <a:p>
             <a:fld id="{13930589-7EDD-4DA6-947C-2EEDC2092145}" type="datetimeFigureOut">
               <a:rPr lang="fr-FR" smtClean="0"/>
-              <a:t>11/03/2024</a:t>
+              <a:t>24/05/2024</a:t>
             </a:fld>
             <a:endParaRPr lang="fr-FR"/>
           </a:p>
@@ -337,7 +337,7 @@
           <a:lstStyle/>
           <a:p>
             <a:r>
-              <a:rPr lang="fr-FR" smtClean="0"/>
+              <a:rPr lang="fr-FR"/>
               <a:t>Modifiez le style du titre</a:t>
             </a:r>
             <a:endParaRPr lang="en-US" dirty="0"/>
@@ -361,35 +361,35 @@
           <a:p>
             <a:pPr lvl="0"/>
             <a:r>
-              <a:rPr lang="fr-FR" smtClean="0"/>
+              <a:rPr lang="fr-FR"/>
               <a:t>Modifier les styles du texte du masque</a:t>
             </a:r>
           </a:p>
           <a:p>
             <a:pPr lvl="1"/>
             <a:r>
-              <a:rPr lang="fr-FR" smtClean="0"/>
+              <a:rPr lang="fr-FR"/>
               <a:t>Deuxième niveau</a:t>
             </a:r>
           </a:p>
           <a:p>
             <a:pPr lvl="2"/>
             <a:r>
-              <a:rPr lang="fr-FR" smtClean="0"/>
+              <a:rPr lang="fr-FR"/>
               <a:t>Troisième niveau</a:t>
             </a:r>
           </a:p>
           <a:p>
             <a:pPr lvl="3"/>
             <a:r>
-              <a:rPr lang="fr-FR" smtClean="0"/>
+              <a:rPr lang="fr-FR"/>
               <a:t>Quatrième niveau</a:t>
             </a:r>
           </a:p>
           <a:p>
             <a:pPr lvl="4"/>
             <a:r>
-              <a:rPr lang="fr-FR" smtClean="0"/>
+              <a:rPr lang="fr-FR"/>
               <a:t>Cinquième niveau</a:t>
             </a:r>
             <a:endParaRPr lang="en-US" dirty="0"/>
@@ -413,7 +413,7 @@
           <a:p>
             <a:fld id="{13930589-7EDD-4DA6-947C-2EEDC2092145}" type="datetimeFigureOut">
               <a:rPr lang="fr-FR" smtClean="0"/>
-              <a:t>11/03/2024</a:t>
+              <a:t>24/05/2024</a:t>
             </a:fld>
             <a:endParaRPr lang="fr-FR"/>
           </a:p>
@@ -512,7 +512,7 @@
           <a:lstStyle/>
           <a:p>
             <a:r>
-              <a:rPr lang="fr-FR" smtClean="0"/>
+              <a:rPr lang="fr-FR"/>
               <a:t>Modifiez le style du titre</a:t>
             </a:r>
             <a:endParaRPr lang="en-US" dirty="0"/>
@@ -541,35 +541,35 @@
           <a:p>
             <a:pPr lvl="0"/>
             <a:r>
-              <a:rPr lang="fr-FR" smtClean="0"/>
+              <a:rPr lang="fr-FR"/>
               <a:t>Modifier les styles du texte du masque</a:t>
             </a:r>
           </a:p>
           <a:p>
             <a:pPr lvl="1"/>
             <a:r>
-              <a:rPr lang="fr-FR" smtClean="0"/>
+              <a:rPr lang="fr-FR"/>
               <a:t>Deuxième niveau</a:t>
             </a:r>
           </a:p>
           <a:p>
             <a:pPr lvl="2"/>
             <a:r>
-              <a:rPr lang="fr-FR" smtClean="0"/>
+              <a:rPr lang="fr-FR"/>
               <a:t>Troisième niveau</a:t>
             </a:r>
           </a:p>
           <a:p>
             <a:pPr lvl="3"/>
             <a:r>
-              <a:rPr lang="fr-FR" smtClean="0"/>
+              <a:rPr lang="fr-FR"/>
               <a:t>Quatrième niveau</a:t>
             </a:r>
           </a:p>
           <a:p>
             <a:pPr lvl="4"/>
             <a:r>
-              <a:rPr lang="fr-FR" smtClean="0"/>
+              <a:rPr lang="fr-FR"/>
               <a:t>Cinquième niveau</a:t>
             </a:r>
             <a:endParaRPr lang="en-US" dirty="0"/>
@@ -593,7 +593,7 @@
           <a:p>
             <a:fld id="{13930589-7EDD-4DA6-947C-2EEDC2092145}" type="datetimeFigureOut">
               <a:rPr lang="fr-FR" smtClean="0"/>
-              <a:t>11/03/2024</a:t>
+              <a:t>24/05/2024</a:t>
             </a:fld>
             <a:endParaRPr lang="fr-FR"/>
           </a:p>
@@ -687,7 +687,7 @@
           <a:lstStyle/>
           <a:p>
             <a:r>
-              <a:rPr lang="fr-FR" smtClean="0"/>
+              <a:rPr lang="fr-FR"/>
               <a:t>Modifiez le style du titre</a:t>
             </a:r>
             <a:endParaRPr lang="en-US" dirty="0"/>
@@ -711,35 +711,35 @@
           <a:p>
             <a:pPr lvl="0"/>
             <a:r>
-              <a:rPr lang="fr-FR" smtClean="0"/>
+              <a:rPr lang="fr-FR"/>
               <a:t>Modifier les styles du texte du masque</a:t>
             </a:r>
           </a:p>
           <a:p>
             <a:pPr lvl="1"/>
             <a:r>
-              <a:rPr lang="fr-FR" smtClean="0"/>
+              <a:rPr lang="fr-FR"/>
               <a:t>Deuxième niveau</a:t>
             </a:r>
           </a:p>
           <a:p>
             <a:pPr lvl="2"/>
             <a:r>
-              <a:rPr lang="fr-FR" smtClean="0"/>
+              <a:rPr lang="fr-FR"/>
               <a:t>Troisième niveau</a:t>
             </a:r>
           </a:p>
           <a:p>
             <a:pPr lvl="3"/>
             <a:r>
-              <a:rPr lang="fr-FR" smtClean="0"/>
+              <a:rPr lang="fr-FR"/>
               <a:t>Quatrième niveau</a:t>
             </a:r>
           </a:p>
           <a:p>
             <a:pPr lvl="4"/>
             <a:r>
-              <a:rPr lang="fr-FR" smtClean="0"/>
+              <a:rPr lang="fr-FR"/>
               <a:t>Cinquième niveau</a:t>
             </a:r>
             <a:endParaRPr lang="en-US" dirty="0"/>
@@ -763,7 +763,7 @@
           <a:p>
             <a:fld id="{13930589-7EDD-4DA6-947C-2EEDC2092145}" type="datetimeFigureOut">
               <a:rPr lang="fr-FR" smtClean="0"/>
-              <a:t>11/03/2024</a:t>
+              <a:t>24/05/2024</a:t>
             </a:fld>
             <a:endParaRPr lang="fr-FR"/>
           </a:p>
@@ -866,7 +866,7 @@
           </a:lstStyle>
           <a:p>
             <a:r>
-              <a:rPr lang="fr-FR" smtClean="0"/>
+              <a:rPr lang="fr-FR"/>
               <a:t>Modifiez le style du titre</a:t>
             </a:r>
             <a:endParaRPr lang="en-US" dirty="0"/>
@@ -984,7 +984,7 @@
           <a:p>
             <a:pPr lvl="0"/>
             <a:r>
-              <a:rPr lang="fr-FR" smtClean="0"/>
+              <a:rPr lang="fr-FR"/>
               <a:t>Modifier les styles du texte du masque</a:t>
             </a:r>
           </a:p>
@@ -1007,7 +1007,7 @@
           <a:p>
             <a:fld id="{13930589-7EDD-4DA6-947C-2EEDC2092145}" type="datetimeFigureOut">
               <a:rPr lang="fr-FR" smtClean="0"/>
-              <a:t>11/03/2024</a:t>
+              <a:t>24/05/2024</a:t>
             </a:fld>
             <a:endParaRPr lang="fr-FR"/>
           </a:p>
@@ -1101,7 +1101,7 @@
           <a:lstStyle/>
           <a:p>
             <a:r>
-              <a:rPr lang="fr-FR" smtClean="0"/>
+              <a:rPr lang="fr-FR"/>
               <a:t>Modifiez le style du titre</a:t>
             </a:r>
             <a:endParaRPr lang="en-US" dirty="0"/>
@@ -1130,35 +1130,35 @@
           <a:p>
             <a:pPr lvl="0"/>
             <a:r>
-              <a:rPr lang="fr-FR" smtClean="0"/>
+              <a:rPr lang="fr-FR"/>
               <a:t>Modifier les styles du texte du masque</a:t>
             </a:r>
           </a:p>
           <a:p>
             <a:pPr lvl="1"/>
             <a:r>
-              <a:rPr lang="fr-FR" smtClean="0"/>
+              <a:rPr lang="fr-FR"/>
               <a:t>Deuxième niveau</a:t>
             </a:r>
           </a:p>
           <a:p>
             <a:pPr lvl="2"/>
             <a:r>
-              <a:rPr lang="fr-FR" smtClean="0"/>
+              <a:rPr lang="fr-FR"/>
               <a:t>Troisième niveau</a:t>
             </a:r>
           </a:p>
           <a:p>
             <a:pPr lvl="3"/>
             <a:r>
-              <a:rPr lang="fr-FR" smtClean="0"/>
+              <a:rPr lang="fr-FR"/>
               <a:t>Quatrième niveau</a:t>
             </a:r>
           </a:p>
           <a:p>
             <a:pPr lvl="4"/>
             <a:r>
-              <a:rPr lang="fr-FR" smtClean="0"/>
+              <a:rPr lang="fr-FR"/>
               <a:t>Cinquième niveau</a:t>
             </a:r>
             <a:endParaRPr lang="en-US" dirty="0"/>
@@ -1187,35 +1187,35 @@
           <a:p>
             <a:pPr lvl="0"/>
             <a:r>
-              <a:rPr lang="fr-FR" smtClean="0"/>
+              <a:rPr lang="fr-FR"/>
               <a:t>Modifier les styles du texte du masque</a:t>
             </a:r>
           </a:p>
           <a:p>
             <a:pPr lvl="1"/>
             <a:r>
-              <a:rPr lang="fr-FR" smtClean="0"/>
+              <a:rPr lang="fr-FR"/>
               <a:t>Deuxième niveau</a:t>
             </a:r>
           </a:p>
           <a:p>
             <a:pPr lvl="2"/>
             <a:r>
-              <a:rPr lang="fr-FR" smtClean="0"/>
+              <a:rPr lang="fr-FR"/>
               <a:t>Troisième niveau</a:t>
             </a:r>
           </a:p>
           <a:p>
             <a:pPr lvl="3"/>
             <a:r>
-              <a:rPr lang="fr-FR" smtClean="0"/>
+              <a:rPr lang="fr-FR"/>
               <a:t>Quatrième niveau</a:t>
             </a:r>
           </a:p>
           <a:p>
             <a:pPr lvl="4"/>
             <a:r>
-              <a:rPr lang="fr-FR" smtClean="0"/>
+              <a:rPr lang="fr-FR"/>
               <a:t>Cinquième niveau</a:t>
             </a:r>
             <a:endParaRPr lang="en-US" dirty="0"/>
@@ -1239,7 +1239,7 @@
           <a:p>
             <a:fld id="{13930589-7EDD-4DA6-947C-2EEDC2092145}" type="datetimeFigureOut">
               <a:rPr lang="fr-FR" smtClean="0"/>
-              <a:t>11/03/2024</a:t>
+              <a:t>24/05/2024</a:t>
             </a:fld>
             <a:endParaRPr lang="fr-FR"/>
           </a:p>
@@ -1338,7 +1338,7 @@
           <a:lstStyle/>
           <a:p>
             <a:r>
-              <a:rPr lang="fr-FR" smtClean="0"/>
+              <a:rPr lang="fr-FR"/>
               <a:t>Modifiez le style du titre</a:t>
             </a:r>
             <a:endParaRPr lang="en-US" dirty="0"/>
@@ -1404,7 +1404,7 @@
           <a:p>
             <a:pPr lvl="0"/>
             <a:r>
-              <a:rPr lang="fr-FR" smtClean="0"/>
+              <a:rPr lang="fr-FR"/>
               <a:t>Modifier les styles du texte du masque</a:t>
             </a:r>
           </a:p>
@@ -1432,35 +1432,35 @@
           <a:p>
             <a:pPr lvl="0"/>
             <a:r>
-              <a:rPr lang="fr-FR" smtClean="0"/>
+              <a:rPr lang="fr-FR"/>
               <a:t>Modifier les styles du texte du masque</a:t>
             </a:r>
           </a:p>
           <a:p>
             <a:pPr lvl="1"/>
             <a:r>
-              <a:rPr lang="fr-FR" smtClean="0"/>
+              <a:rPr lang="fr-FR"/>
               <a:t>Deuxième niveau</a:t>
             </a:r>
           </a:p>
           <a:p>
             <a:pPr lvl="2"/>
             <a:r>
-              <a:rPr lang="fr-FR" smtClean="0"/>
+              <a:rPr lang="fr-FR"/>
               <a:t>Troisième niveau</a:t>
             </a:r>
           </a:p>
           <a:p>
             <a:pPr lvl="3"/>
             <a:r>
-              <a:rPr lang="fr-FR" smtClean="0"/>
+              <a:rPr lang="fr-FR"/>
               <a:t>Quatrième niveau</a:t>
             </a:r>
           </a:p>
           <a:p>
             <a:pPr lvl="4"/>
             <a:r>
-              <a:rPr lang="fr-FR" smtClean="0"/>
+              <a:rPr lang="fr-FR"/>
               <a:t>Cinquième niveau</a:t>
             </a:r>
             <a:endParaRPr lang="en-US" dirty="0"/>
@@ -1526,7 +1526,7 @@
           <a:p>
             <a:pPr lvl="0"/>
             <a:r>
-              <a:rPr lang="fr-FR" smtClean="0"/>
+              <a:rPr lang="fr-FR"/>
               <a:t>Modifier les styles du texte du masque</a:t>
             </a:r>
           </a:p>
@@ -1554,35 +1554,35 @@
           <a:p>
             <a:pPr lvl="0"/>
             <a:r>
-              <a:rPr lang="fr-FR" smtClean="0"/>
+              <a:rPr lang="fr-FR"/>
               <a:t>Modifier les styles du texte du masque</a:t>
             </a:r>
           </a:p>
           <a:p>
             <a:pPr lvl="1"/>
             <a:r>
-              <a:rPr lang="fr-FR" smtClean="0"/>
+              <a:rPr lang="fr-FR"/>
               <a:t>Deuxième niveau</a:t>
             </a:r>
           </a:p>
           <a:p>
             <a:pPr lvl="2"/>
             <a:r>
-              <a:rPr lang="fr-FR" smtClean="0"/>
+              <a:rPr lang="fr-FR"/>
               <a:t>Troisième niveau</a:t>
             </a:r>
           </a:p>
           <a:p>
             <a:pPr lvl="3"/>
             <a:r>
-              <a:rPr lang="fr-FR" smtClean="0"/>
+              <a:rPr lang="fr-FR"/>
               <a:t>Quatrième niveau</a:t>
             </a:r>
           </a:p>
           <a:p>
             <a:pPr lvl="4"/>
             <a:r>
-              <a:rPr lang="fr-FR" smtClean="0"/>
+              <a:rPr lang="fr-FR"/>
               <a:t>Cinquième niveau</a:t>
             </a:r>
             <a:endParaRPr lang="en-US" dirty="0"/>
@@ -1606,7 +1606,7 @@
           <a:p>
             <a:fld id="{13930589-7EDD-4DA6-947C-2EEDC2092145}" type="datetimeFigureOut">
               <a:rPr lang="fr-FR" smtClean="0"/>
-              <a:t>11/03/2024</a:t>
+              <a:t>24/05/2024</a:t>
             </a:fld>
             <a:endParaRPr lang="fr-FR"/>
           </a:p>
@@ -1700,7 +1700,7 @@
           <a:lstStyle/>
           <a:p>
             <a:r>
-              <a:rPr lang="fr-FR" smtClean="0"/>
+              <a:rPr lang="fr-FR"/>
               <a:t>Modifiez le style du titre</a:t>
             </a:r>
             <a:endParaRPr lang="en-US" dirty="0"/>
@@ -1724,7 +1724,7 @@
           <a:p>
             <a:fld id="{13930589-7EDD-4DA6-947C-2EEDC2092145}" type="datetimeFigureOut">
               <a:rPr lang="fr-FR" smtClean="0"/>
-              <a:t>11/03/2024</a:t>
+              <a:t>24/05/2024</a:t>
             </a:fld>
             <a:endParaRPr lang="fr-FR"/>
           </a:p>
@@ -1819,7 +1819,7 @@
           <a:p>
             <a:fld id="{13930589-7EDD-4DA6-947C-2EEDC2092145}" type="datetimeFigureOut">
               <a:rPr lang="fr-FR" smtClean="0"/>
-              <a:t>11/03/2024</a:t>
+              <a:t>24/05/2024</a:t>
             </a:fld>
             <a:endParaRPr lang="fr-FR"/>
           </a:p>
@@ -1922,7 +1922,7 @@
           </a:lstStyle>
           <a:p>
             <a:r>
-              <a:rPr lang="fr-FR" smtClean="0"/>
+              <a:rPr lang="fr-FR"/>
               <a:t>Modifiez le style du titre</a:t>
             </a:r>
             <a:endParaRPr lang="en-US" dirty="0"/>
@@ -1979,35 +1979,35 @@
           <a:p>
             <a:pPr lvl="0"/>
             <a:r>
-              <a:rPr lang="fr-FR" smtClean="0"/>
+              <a:rPr lang="fr-FR"/>
               <a:t>Modifier les styles du texte du masque</a:t>
             </a:r>
           </a:p>
           <a:p>
             <a:pPr lvl="1"/>
             <a:r>
-              <a:rPr lang="fr-FR" smtClean="0"/>
+              <a:rPr lang="fr-FR"/>
               <a:t>Deuxième niveau</a:t>
             </a:r>
           </a:p>
           <a:p>
             <a:pPr lvl="2"/>
             <a:r>
-              <a:rPr lang="fr-FR" smtClean="0"/>
+              <a:rPr lang="fr-FR"/>
               <a:t>Troisième niveau</a:t>
             </a:r>
           </a:p>
           <a:p>
             <a:pPr lvl="3"/>
             <a:r>
-              <a:rPr lang="fr-FR" smtClean="0"/>
+              <a:rPr lang="fr-FR"/>
               <a:t>Quatrième niveau</a:t>
             </a:r>
           </a:p>
           <a:p>
             <a:pPr lvl="4"/>
             <a:r>
-              <a:rPr lang="fr-FR" smtClean="0"/>
+              <a:rPr lang="fr-FR"/>
               <a:t>Cinquième niveau</a:t>
             </a:r>
             <a:endParaRPr lang="en-US" dirty="0"/>
@@ -2073,7 +2073,7 @@
           <a:p>
             <a:pPr lvl="0"/>
             <a:r>
-              <a:rPr lang="fr-FR" smtClean="0"/>
+              <a:rPr lang="fr-FR"/>
               <a:t>Modifier les styles du texte du masque</a:t>
             </a:r>
           </a:p>
@@ -2096,7 +2096,7 @@
           <a:p>
             <a:fld id="{13930589-7EDD-4DA6-947C-2EEDC2092145}" type="datetimeFigureOut">
               <a:rPr lang="fr-FR" smtClean="0"/>
-              <a:t>11/03/2024</a:t>
+              <a:t>24/05/2024</a:t>
             </a:fld>
             <a:endParaRPr lang="fr-FR"/>
           </a:p>
@@ -2199,7 +2199,7 @@
           </a:lstStyle>
           <a:p>
             <a:r>
-              <a:rPr lang="fr-FR" smtClean="0"/>
+              <a:rPr lang="fr-FR"/>
               <a:t>Modifiez le style du titre</a:t>
             </a:r>
             <a:endParaRPr lang="en-US" dirty="0"/>
@@ -2264,7 +2264,7 @@
           </a:lstStyle>
           <a:p>
             <a:r>
-              <a:rPr lang="fr-FR" smtClean="0"/>
+              <a:rPr lang="fr-FR"/>
               <a:t>Cliquez sur l'icône pour ajouter une image</a:t>
             </a:r>
             <a:endParaRPr lang="en-US" dirty="0"/>
@@ -2330,7 +2330,7 @@
           <a:p>
             <a:pPr lvl="0"/>
             <a:r>
-              <a:rPr lang="fr-FR" smtClean="0"/>
+              <a:rPr lang="fr-FR"/>
               <a:t>Modifier les styles du texte du masque</a:t>
             </a:r>
           </a:p>
@@ -2353,7 +2353,7 @@
           <a:p>
             <a:fld id="{13930589-7EDD-4DA6-947C-2EEDC2092145}" type="datetimeFigureOut">
               <a:rPr lang="fr-FR" smtClean="0"/>
-              <a:t>11/03/2024</a:t>
+              <a:t>24/05/2024</a:t>
             </a:fld>
             <a:endParaRPr lang="fr-FR"/>
           </a:p>
@@ -2462,7 +2462,7 @@
           <a:lstStyle/>
           <a:p>
             <a:r>
-              <a:rPr lang="fr-FR" smtClean="0"/>
+              <a:rPr lang="fr-FR"/>
               <a:t>Modifiez le style du titre</a:t>
             </a:r>
             <a:endParaRPr lang="en-US" dirty="0"/>
@@ -2496,35 +2496,35 @@
           <a:p>
             <a:pPr lvl="0"/>
             <a:r>
-              <a:rPr lang="fr-FR" smtClean="0"/>
+              <a:rPr lang="fr-FR"/>
               <a:t>Modifier les styles du texte du masque</a:t>
             </a:r>
           </a:p>
           <a:p>
             <a:pPr lvl="1"/>
             <a:r>
-              <a:rPr lang="fr-FR" smtClean="0"/>
+              <a:rPr lang="fr-FR"/>
               <a:t>Deuxième niveau</a:t>
             </a:r>
           </a:p>
           <a:p>
             <a:pPr lvl="2"/>
             <a:r>
-              <a:rPr lang="fr-FR" smtClean="0"/>
+              <a:rPr lang="fr-FR"/>
               <a:t>Troisième niveau</a:t>
             </a:r>
           </a:p>
           <a:p>
             <a:pPr lvl="3"/>
             <a:r>
-              <a:rPr lang="fr-FR" smtClean="0"/>
+              <a:rPr lang="fr-FR"/>
               <a:t>Quatrième niveau</a:t>
             </a:r>
           </a:p>
           <a:p>
             <a:pPr lvl="4"/>
             <a:r>
-              <a:rPr lang="fr-FR" smtClean="0"/>
+              <a:rPr lang="fr-FR"/>
               <a:t>Cinquième niveau</a:t>
             </a:r>
             <a:endParaRPr lang="en-US" dirty="0"/>
@@ -2566,7 +2566,7 @@
           <a:p>
             <a:fld id="{13930589-7EDD-4DA6-947C-2EEDC2092145}" type="datetimeFigureOut">
               <a:rPr lang="fr-FR" smtClean="0"/>
-              <a:t>11/03/2024</a:t>
+              <a:t>24/05/2024</a:t>
             </a:fld>
             <a:endParaRPr lang="fr-FR"/>
           </a:p>
@@ -3598,7 +3598,7 @@
                     <a:latin typeface="Arial" panose="020B0604020202020204" pitchFamily="34" charset="0"/>
                     <a:cs typeface="Arial" panose="020B0604020202020204" pitchFamily="34" charset="0"/>
                   </a:rPr>
-                  <a:t>: Monoculture</a:t>
+                  <a:t>: pure stand</a:t>
                 </a:r>
               </a:p>
             </p:txBody>
@@ -3613,9 +3613,9 @@
           <p:grpSpPr>
             <a:xfrm>
               <a:off x="2979234" y="6642873"/>
-              <a:ext cx="2040877" cy="686891"/>
+              <a:ext cx="2392311" cy="686891"/>
               <a:chOff x="4713513" y="5641004"/>
-              <a:chExt cx="2040877" cy="686891"/>
+              <a:chExt cx="2392311" cy="686891"/>
             </a:xfrm>
           </p:grpSpPr>
           <p:grpSp>
@@ -3963,8 +3963,8 @@
             </p:nvSpPr>
             <p:spPr>
               <a:xfrm>
-                <a:off x="5587271" y="5792028"/>
-                <a:ext cx="1167119" cy="338554"/>
+                <a:off x="5554317" y="5792028"/>
+                <a:ext cx="1551507" cy="338554"/>
               </a:xfrm>
               <a:prstGeom prst="rect">
                 <a:avLst/>
@@ -3982,7 +3982,7 @@
                     <a:latin typeface="Arial" panose="020B0604020202020204" pitchFamily="34" charset="0"/>
                     <a:cs typeface="Arial" panose="020B0604020202020204" pitchFamily="34" charset="0"/>
                   </a:rPr>
-                  <a:t>: Mixture</a:t>
+                  <a:t>: mixed stand</a:t>
                 </a:r>
               </a:p>
             </p:txBody>

</xml_diff>

<commit_message>
Reformatting Figure following ms acceptance
</commit_message>
<xml_diff>
--- a/manuscript/Figures_&_tables/Figure_1_design.pptx
+++ b/manuscript/Figures_&_tables/Figure_1_design.pptx
@@ -243,7 +243,7 @@
           <a:p>
             <a:fld id="{13930589-7EDD-4DA6-947C-2EEDC2092145}" type="datetimeFigureOut">
               <a:rPr lang="fr-FR" smtClean="0"/>
-              <a:t>15/11/2024</a:t>
+              <a:t>08/04/2025</a:t>
             </a:fld>
             <a:endParaRPr lang="fr-FR"/>
           </a:p>
@@ -413,7 +413,7 @@
           <a:p>
             <a:fld id="{13930589-7EDD-4DA6-947C-2EEDC2092145}" type="datetimeFigureOut">
               <a:rPr lang="fr-FR" smtClean="0"/>
-              <a:t>15/11/2024</a:t>
+              <a:t>08/04/2025</a:t>
             </a:fld>
             <a:endParaRPr lang="fr-FR"/>
           </a:p>
@@ -593,7 +593,7 @@
           <a:p>
             <a:fld id="{13930589-7EDD-4DA6-947C-2EEDC2092145}" type="datetimeFigureOut">
               <a:rPr lang="fr-FR" smtClean="0"/>
-              <a:t>15/11/2024</a:t>
+              <a:t>08/04/2025</a:t>
             </a:fld>
             <a:endParaRPr lang="fr-FR"/>
           </a:p>
@@ -763,7 +763,7 @@
           <a:p>
             <a:fld id="{13930589-7EDD-4DA6-947C-2EEDC2092145}" type="datetimeFigureOut">
               <a:rPr lang="fr-FR" smtClean="0"/>
-              <a:t>15/11/2024</a:t>
+              <a:t>08/04/2025</a:t>
             </a:fld>
             <a:endParaRPr lang="fr-FR"/>
           </a:p>
@@ -1007,7 +1007,7 @@
           <a:p>
             <a:fld id="{13930589-7EDD-4DA6-947C-2EEDC2092145}" type="datetimeFigureOut">
               <a:rPr lang="fr-FR" smtClean="0"/>
-              <a:t>15/11/2024</a:t>
+              <a:t>08/04/2025</a:t>
             </a:fld>
             <a:endParaRPr lang="fr-FR"/>
           </a:p>
@@ -1239,7 +1239,7 @@
           <a:p>
             <a:fld id="{13930589-7EDD-4DA6-947C-2EEDC2092145}" type="datetimeFigureOut">
               <a:rPr lang="fr-FR" smtClean="0"/>
-              <a:t>15/11/2024</a:t>
+              <a:t>08/04/2025</a:t>
             </a:fld>
             <a:endParaRPr lang="fr-FR"/>
           </a:p>
@@ -1606,7 +1606,7 @@
           <a:p>
             <a:fld id="{13930589-7EDD-4DA6-947C-2EEDC2092145}" type="datetimeFigureOut">
               <a:rPr lang="fr-FR" smtClean="0"/>
-              <a:t>15/11/2024</a:t>
+              <a:t>08/04/2025</a:t>
             </a:fld>
             <a:endParaRPr lang="fr-FR"/>
           </a:p>
@@ -1724,7 +1724,7 @@
           <a:p>
             <a:fld id="{13930589-7EDD-4DA6-947C-2EEDC2092145}" type="datetimeFigureOut">
               <a:rPr lang="fr-FR" smtClean="0"/>
-              <a:t>15/11/2024</a:t>
+              <a:t>08/04/2025</a:t>
             </a:fld>
             <a:endParaRPr lang="fr-FR"/>
           </a:p>
@@ -1819,7 +1819,7 @@
           <a:p>
             <a:fld id="{13930589-7EDD-4DA6-947C-2EEDC2092145}" type="datetimeFigureOut">
               <a:rPr lang="fr-FR" smtClean="0"/>
-              <a:t>15/11/2024</a:t>
+              <a:t>08/04/2025</a:t>
             </a:fld>
             <a:endParaRPr lang="fr-FR"/>
           </a:p>
@@ -2096,7 +2096,7 @@
           <a:p>
             <a:fld id="{13930589-7EDD-4DA6-947C-2EEDC2092145}" type="datetimeFigureOut">
               <a:rPr lang="fr-FR" smtClean="0"/>
-              <a:t>15/11/2024</a:t>
+              <a:t>08/04/2025</a:t>
             </a:fld>
             <a:endParaRPr lang="fr-FR"/>
           </a:p>
@@ -2353,7 +2353,7 @@
           <a:p>
             <a:fld id="{13930589-7EDD-4DA6-947C-2EEDC2092145}" type="datetimeFigureOut">
               <a:rPr lang="fr-FR" smtClean="0"/>
-              <a:t>15/11/2024</a:t>
+              <a:t>08/04/2025</a:t>
             </a:fld>
             <a:endParaRPr lang="fr-FR"/>
           </a:p>
@@ -2566,7 +2566,7 @@
           <a:p>
             <a:fld id="{13930589-7EDD-4DA6-947C-2EEDC2092145}" type="datetimeFigureOut">
               <a:rPr lang="fr-FR" smtClean="0"/>
-              <a:t>15/11/2024</a:t>
+              <a:t>08/04/2025</a:t>
             </a:fld>
             <a:endParaRPr lang="fr-FR"/>
           </a:p>
@@ -3997,7 +3997,7 @@
                 <a:latin typeface="Arial" panose="020B0604020202020204" pitchFamily="34" charset="0"/>
                 <a:cs typeface="Arial" panose="020B0604020202020204" pitchFamily="34" charset="0"/>
               </a:rPr>
-              <a:t>(a)</a:t>
+              <a:t>(A)</a:t>
             </a:r>
           </a:p>
         </p:txBody>
@@ -4030,7 +4030,7 @@
                 <a:latin typeface="Arial" panose="020B0604020202020204" pitchFamily="34" charset="0"/>
                 <a:cs typeface="Arial" panose="020B0604020202020204" pitchFamily="34" charset="0"/>
               </a:rPr>
-              <a:t>(b)</a:t>
+              <a:t>(B)</a:t>
             </a:r>
           </a:p>
         </p:txBody>
@@ -4063,7 +4063,7 @@
                 <a:latin typeface="Arial" panose="020B0604020202020204" pitchFamily="34" charset="0"/>
                 <a:cs typeface="Arial" panose="020B0604020202020204" pitchFamily="34" charset="0"/>
               </a:rPr>
-              <a:t>(c)</a:t>
+              <a:t>(C)</a:t>
             </a:r>
           </a:p>
         </p:txBody>
@@ -4092,12 +4092,16 @@
           <a:p>
             <a:pPr algn="ctr"/>
             <a:r>
-              <a:rPr lang="fr-FR" sz="1600" b="1" dirty="0">
+              <a:rPr lang="fr-FR" sz="1600" b="1">
                 <a:latin typeface="Arial" panose="020B0604020202020204" pitchFamily="34" charset="0"/>
                 <a:cs typeface="Arial" panose="020B0604020202020204" pitchFamily="34" charset="0"/>
               </a:rPr>
-              <a:t>(d)</a:t>
+              <a:t>(D)</a:t>
             </a:r>
+            <a:endParaRPr lang="fr-FR" sz="1600" b="1" dirty="0">
+              <a:latin typeface="Arial" panose="020B0604020202020204" pitchFamily="34" charset="0"/>
+              <a:cs typeface="Arial" panose="020B0604020202020204" pitchFamily="34" charset="0"/>
+            </a:endParaRPr>
           </a:p>
         </p:txBody>
       </p:sp>

</xml_diff>